<commit_message>
1.Text to vector.py:bow dtype change to int8 2.train all industry excluding "控股" over random 50000 vipnews 3.ArticlesRep.py : able to use custom metric
</commit_message>
<xml_diff>
--- a/Slide/SDAE.pptx
+++ b/Slide/SDAE.pptx
@@ -7,31 +7,32 @@
   <p:sldIdLst>
     <p:sldId id="256" r:id="rId2"/>
     <p:sldId id="257" r:id="rId3"/>
-    <p:sldId id="258" r:id="rId4"/>
-    <p:sldId id="259" r:id="rId5"/>
-    <p:sldId id="260" r:id="rId6"/>
-    <p:sldId id="261" r:id="rId7"/>
-    <p:sldId id="262" r:id="rId8"/>
-    <p:sldId id="279" r:id="rId9"/>
-    <p:sldId id="272" r:id="rId10"/>
-    <p:sldId id="273" r:id="rId11"/>
-    <p:sldId id="263" r:id="rId12"/>
-    <p:sldId id="264" r:id="rId13"/>
-    <p:sldId id="265" r:id="rId14"/>
-    <p:sldId id="266" r:id="rId15"/>
-    <p:sldId id="267" r:id="rId16"/>
-    <p:sldId id="268" r:id="rId17"/>
-    <p:sldId id="269" r:id="rId18"/>
-    <p:sldId id="270" r:id="rId19"/>
-    <p:sldId id="271" r:id="rId20"/>
-    <p:sldId id="280" r:id="rId21"/>
-    <p:sldId id="274" r:id="rId22"/>
-    <p:sldId id="275" r:id="rId23"/>
-    <p:sldId id="277" r:id="rId24"/>
-    <p:sldId id="276" r:id="rId25"/>
-    <p:sldId id="278" r:id="rId26"/>
-    <p:sldId id="281" r:id="rId27"/>
-    <p:sldId id="282" r:id="rId28"/>
+    <p:sldId id="283" r:id="rId4"/>
+    <p:sldId id="258" r:id="rId5"/>
+    <p:sldId id="259" r:id="rId6"/>
+    <p:sldId id="260" r:id="rId7"/>
+    <p:sldId id="261" r:id="rId8"/>
+    <p:sldId id="262" r:id="rId9"/>
+    <p:sldId id="279" r:id="rId10"/>
+    <p:sldId id="272" r:id="rId11"/>
+    <p:sldId id="273" r:id="rId12"/>
+    <p:sldId id="263" r:id="rId13"/>
+    <p:sldId id="264" r:id="rId14"/>
+    <p:sldId id="265" r:id="rId15"/>
+    <p:sldId id="266" r:id="rId16"/>
+    <p:sldId id="267" r:id="rId17"/>
+    <p:sldId id="268" r:id="rId18"/>
+    <p:sldId id="269" r:id="rId19"/>
+    <p:sldId id="270" r:id="rId20"/>
+    <p:sldId id="271" r:id="rId21"/>
+    <p:sldId id="280" r:id="rId22"/>
+    <p:sldId id="274" r:id="rId23"/>
+    <p:sldId id="275" r:id="rId24"/>
+    <p:sldId id="277" r:id="rId25"/>
+    <p:sldId id="276" r:id="rId26"/>
+    <p:sldId id="278" r:id="rId27"/>
+    <p:sldId id="281" r:id="rId28"/>
+    <p:sldId id="282" r:id="rId29"/>
   </p:sldIdLst>
   <p:sldSz cx="9144000" cy="6858000" type="screen4x3"/>
   <p:notesSz cx="6858000" cy="9144000"/>
@@ -314,7 +315,7 @@
           <a:p>
             <a:fld id="{5BBEAD13-0566-4C6C-97E7-55F17F24B09F}" type="datetimeFigureOut">
               <a:rPr lang="zh-TW" altLang="en-US" smtClean="0"/>
-              <a:t>2018/11/28</a:t>
+              <a:t>2018/12/6</a:t>
             </a:fld>
             <a:endParaRPr lang="zh-TW" altLang="en-US"/>
           </a:p>
@@ -479,7 +480,7 @@
           <a:p>
             <a:fld id="{5BBEAD13-0566-4C6C-97E7-55F17F24B09F}" type="datetimeFigureOut">
               <a:rPr lang="zh-TW" altLang="en-US" smtClean="0"/>
-              <a:t>2018/11/28</a:t>
+              <a:t>2018/12/6</a:t>
             </a:fld>
             <a:endParaRPr lang="zh-TW" altLang="en-US"/>
           </a:p>
@@ -654,7 +655,7 @@
           <a:p>
             <a:fld id="{5BBEAD13-0566-4C6C-97E7-55F17F24B09F}" type="datetimeFigureOut">
               <a:rPr lang="zh-TW" altLang="en-US" smtClean="0"/>
-              <a:t>2018/11/28</a:t>
+              <a:t>2018/12/6</a:t>
             </a:fld>
             <a:endParaRPr lang="zh-TW" altLang="en-US"/>
           </a:p>
@@ -819,7 +820,7 @@
           <a:p>
             <a:fld id="{5BBEAD13-0566-4C6C-97E7-55F17F24B09F}" type="datetimeFigureOut">
               <a:rPr lang="zh-TW" altLang="en-US" smtClean="0"/>
-              <a:t>2018/11/28</a:t>
+              <a:t>2018/12/6</a:t>
             </a:fld>
             <a:endParaRPr lang="zh-TW" altLang="en-US"/>
           </a:p>
@@ -1060,7 +1061,7 @@
           <a:p>
             <a:fld id="{5BBEAD13-0566-4C6C-97E7-55F17F24B09F}" type="datetimeFigureOut">
               <a:rPr lang="zh-TW" altLang="en-US" smtClean="0"/>
-              <a:t>2018/11/28</a:t>
+              <a:t>2018/12/6</a:t>
             </a:fld>
             <a:endParaRPr lang="zh-TW" altLang="en-US"/>
           </a:p>
@@ -1343,7 +1344,7 @@
           <a:p>
             <a:fld id="{5BBEAD13-0566-4C6C-97E7-55F17F24B09F}" type="datetimeFigureOut">
               <a:rPr lang="zh-TW" altLang="en-US" smtClean="0"/>
-              <a:t>2018/11/28</a:t>
+              <a:t>2018/12/6</a:t>
             </a:fld>
             <a:endParaRPr lang="zh-TW" altLang="en-US"/>
           </a:p>
@@ -1760,7 +1761,7 @@
           <a:p>
             <a:fld id="{5BBEAD13-0566-4C6C-97E7-55F17F24B09F}" type="datetimeFigureOut">
               <a:rPr lang="zh-TW" altLang="en-US" smtClean="0"/>
-              <a:t>2018/11/28</a:t>
+              <a:t>2018/12/6</a:t>
             </a:fld>
             <a:endParaRPr lang="zh-TW" altLang="en-US"/>
           </a:p>
@@ -1873,7 +1874,7 @@
           <a:p>
             <a:fld id="{5BBEAD13-0566-4C6C-97E7-55F17F24B09F}" type="datetimeFigureOut">
               <a:rPr lang="zh-TW" altLang="en-US" smtClean="0"/>
-              <a:t>2018/11/28</a:t>
+              <a:t>2018/12/6</a:t>
             </a:fld>
             <a:endParaRPr lang="zh-TW" altLang="en-US"/>
           </a:p>
@@ -1963,7 +1964,7 @@
           <a:p>
             <a:fld id="{5BBEAD13-0566-4C6C-97E7-55F17F24B09F}" type="datetimeFigureOut">
               <a:rPr lang="zh-TW" altLang="en-US" smtClean="0"/>
-              <a:t>2018/11/28</a:t>
+              <a:t>2018/12/6</a:t>
             </a:fld>
             <a:endParaRPr lang="zh-TW" altLang="en-US"/>
           </a:p>
@@ -2235,7 +2236,7 @@
           <a:p>
             <a:fld id="{5BBEAD13-0566-4C6C-97E7-55F17F24B09F}" type="datetimeFigureOut">
               <a:rPr lang="zh-TW" altLang="en-US" smtClean="0"/>
-              <a:t>2018/11/28</a:t>
+              <a:t>2018/12/6</a:t>
             </a:fld>
             <a:endParaRPr lang="zh-TW" altLang="en-US"/>
           </a:p>
@@ -2483,7 +2484,7 @@
           <a:p>
             <a:fld id="{5BBEAD13-0566-4C6C-97E7-55F17F24B09F}" type="datetimeFigureOut">
               <a:rPr lang="zh-TW" altLang="en-US" smtClean="0"/>
-              <a:t>2018/11/28</a:t>
+              <a:t>2018/12/6</a:t>
             </a:fld>
             <a:endParaRPr lang="zh-TW" altLang="en-US"/>
           </a:p>
@@ -2691,7 +2692,7 @@
           <a:p>
             <a:fld id="{5BBEAD13-0566-4C6C-97E7-55F17F24B09F}" type="datetimeFigureOut">
               <a:rPr lang="zh-TW" altLang="en-US" smtClean="0"/>
-              <a:t>2018/11/28</a:t>
+              <a:t>2018/12/6</a:t>
             </a:fld>
             <a:endParaRPr lang="zh-TW" altLang="en-US"/>
           </a:p>
@@ -3061,6 +3062,39 @@
           <a:chExt cx="0" cy="0"/>
         </a:xfrm>
       </p:grpSpPr>
+      <p:sp>
+        <p:nvSpPr>
+          <p:cNvPr id="2" name="矩形 1"/>
+          <p:cNvSpPr/>
+          <p:nvPr/>
+        </p:nvSpPr>
+        <p:spPr>
+          <a:xfrm>
+            <a:off x="3541333" y="2492896"/>
+            <a:ext cx="1829347" cy="646331"/>
+          </a:xfrm>
+          <a:prstGeom prst="rect">
+            <a:avLst/>
+          </a:prstGeom>
+        </p:spPr>
+        <p:txBody>
+          <a:bodyPr wrap="none">
+            <a:spAutoFit/>
+          </a:bodyPr>
+          <a:lstStyle/>
+          <a:p>
+            <a:r>
+              <a:rPr lang="en-US" altLang="zh-TW" sz="3600" dirty="0" smtClean="0"/>
+              <a:t>VIP </a:t>
+            </a:r>
+            <a:r>
+              <a:rPr lang="zh-TW" altLang="en-US" sz="3600" dirty="0" smtClean="0"/>
+              <a:t>新聞</a:t>
+            </a:r>
+            <a:endParaRPr lang="zh-TW" altLang="en-US" sz="3600" dirty="0"/>
+          </a:p>
+        </p:txBody>
+      </p:sp>
     </p:spTree>
     <p:extLst>
       <p:ext uri="{BB962C8B-B14F-4D97-AF65-F5344CB8AC3E}">
@@ -3108,7 +3142,7 @@
           <a:p>
             <a:r>
               <a:rPr lang="en-US" altLang="zh-TW" dirty="0" smtClean="0"/>
-              <a:t>Decoder</a:t>
+              <a:t>Encoder</a:t>
             </a:r>
             <a:endParaRPr lang="zh-TW" altLang="en-US" dirty="0"/>
           </a:p>
@@ -3116,7 +3150,7 @@
       </p:sp>
       <p:pic>
         <p:nvPicPr>
-          <p:cNvPr id="6" name="內容版面配置區 5"/>
+          <p:cNvPr id="4" name="內容版面配置區 3"/>
           <p:cNvPicPr>
             <a:picLocks noGrp="1" noChangeAspect="1"/>
           </p:cNvPicPr>
@@ -3138,14 +3172,14 @@
         </p:blipFill>
         <p:spPr>
           <a:xfrm>
-            <a:off x="971600" y="2529583"/>
-            <a:ext cx="1524000" cy="1495425"/>
+            <a:off x="1115616" y="2420888"/>
+            <a:ext cx="2181225" cy="2428875"/>
           </a:xfrm>
         </p:spPr>
       </p:pic>
       <p:pic>
         <p:nvPicPr>
-          <p:cNvPr id="7" name="圖片 6" descr="畫面剪輯"/>
+          <p:cNvPr id="5" name="圖片 4" descr="畫面剪輯"/>
           <p:cNvPicPr>
             <a:picLocks noChangeAspect="1"/>
           </p:cNvPicPr>
@@ -3165,8 +3199,8 @@
         </p:blipFill>
         <p:spPr>
           <a:xfrm>
-            <a:off x="3275856" y="2420888"/>
-            <a:ext cx="5134692" cy="1829055"/>
+            <a:off x="3563888" y="2492896"/>
+            <a:ext cx="5087060" cy="2038635"/>
           </a:xfrm>
           <a:prstGeom prst="rect">
             <a:avLst/>
@@ -3176,7 +3210,7 @@
     </p:spTree>
     <p:extLst>
       <p:ext uri="{BB962C8B-B14F-4D97-AF65-F5344CB8AC3E}">
-        <p14:creationId xmlns:p14="http://schemas.microsoft.com/office/powerpoint/2010/main" val="2366454564"/>
+        <p14:creationId xmlns:p14="http://schemas.microsoft.com/office/powerpoint/2010/main" val="1253809794"/>
       </p:ext>
     </p:extLst>
   </p:cSld>
@@ -3220,6 +3254,118 @@
           <a:p>
             <a:r>
               <a:rPr lang="en-US" altLang="zh-TW" dirty="0" smtClean="0"/>
+              <a:t>Decoder</a:t>
+            </a:r>
+            <a:endParaRPr lang="zh-TW" altLang="en-US" dirty="0"/>
+          </a:p>
+        </p:txBody>
+      </p:sp>
+      <p:pic>
+        <p:nvPicPr>
+          <p:cNvPr id="6" name="內容版面配置區 5"/>
+          <p:cNvPicPr>
+            <a:picLocks noGrp="1" noChangeAspect="1"/>
+          </p:cNvPicPr>
+          <p:nvPr>
+            <p:ph idx="1"/>
+          </p:nvPr>
+        </p:nvPicPr>
+        <p:blipFill>
+          <a:blip r:embed="rId2">
+            <a:extLst>
+              <a:ext uri="{28A0092B-C50C-407E-A947-70E740481C1C}">
+                <a14:useLocalDpi xmlns:a14="http://schemas.microsoft.com/office/drawing/2010/main" val="0"/>
+              </a:ext>
+            </a:extLst>
+          </a:blip>
+          <a:stretch>
+            <a:fillRect/>
+          </a:stretch>
+        </p:blipFill>
+        <p:spPr>
+          <a:xfrm>
+            <a:off x="971600" y="2529583"/>
+            <a:ext cx="1524000" cy="1495425"/>
+          </a:xfrm>
+        </p:spPr>
+      </p:pic>
+      <p:pic>
+        <p:nvPicPr>
+          <p:cNvPr id="7" name="圖片 6" descr="畫面剪輯"/>
+          <p:cNvPicPr>
+            <a:picLocks noChangeAspect="1"/>
+          </p:cNvPicPr>
+          <p:nvPr/>
+        </p:nvPicPr>
+        <p:blipFill>
+          <a:blip r:embed="rId3">
+            <a:extLst>
+              <a:ext uri="{28A0092B-C50C-407E-A947-70E740481C1C}">
+                <a14:useLocalDpi xmlns:a14="http://schemas.microsoft.com/office/drawing/2010/main" val="0"/>
+              </a:ext>
+            </a:extLst>
+          </a:blip>
+          <a:stretch>
+            <a:fillRect/>
+          </a:stretch>
+        </p:blipFill>
+        <p:spPr>
+          <a:xfrm>
+            <a:off x="3275856" y="2420888"/>
+            <a:ext cx="5134692" cy="1829055"/>
+          </a:xfrm>
+          <a:prstGeom prst="rect">
+            <a:avLst/>
+          </a:prstGeom>
+        </p:spPr>
+      </p:pic>
+    </p:spTree>
+    <p:extLst>
+      <p:ext uri="{BB962C8B-B14F-4D97-AF65-F5344CB8AC3E}">
+        <p14:creationId xmlns:p14="http://schemas.microsoft.com/office/powerpoint/2010/main" val="2366454564"/>
+      </p:ext>
+    </p:extLst>
+  </p:cSld>
+  <p:clrMapOvr>
+    <a:masterClrMapping/>
+  </p:clrMapOvr>
+</p:sld>
+</file>
+
+<file path=ppt/slides/slide12.xml><?xml version="1.0" encoding="utf-8"?>
+<p:sld xmlns:a="http://schemas.openxmlformats.org/drawingml/2006/main" xmlns:r="http://schemas.openxmlformats.org/officeDocument/2006/relationships" xmlns:p="http://schemas.openxmlformats.org/presentationml/2006/main">
+  <p:cSld>
+    <p:spTree>
+      <p:nvGrpSpPr>
+        <p:cNvPr id="1" name=""/>
+        <p:cNvGrpSpPr/>
+        <p:nvPr/>
+      </p:nvGrpSpPr>
+      <p:grpSpPr>
+        <a:xfrm>
+          <a:off x="0" y="0"/>
+          <a:ext cx="0" cy="0"/>
+          <a:chOff x="0" y="0"/>
+          <a:chExt cx="0" cy="0"/>
+        </a:xfrm>
+      </p:grpSpPr>
+      <p:sp>
+        <p:nvSpPr>
+          <p:cNvPr id="2" name="標題 1"/>
+          <p:cNvSpPr>
+            <a:spLocks noGrp="1"/>
+          </p:cNvSpPr>
+          <p:nvPr>
+            <p:ph type="title"/>
+          </p:nvPr>
+        </p:nvSpPr>
+        <p:spPr/>
+        <p:txBody>
+          <a:bodyPr/>
+          <a:lstStyle/>
+          <a:p>
+            <a:r>
+              <a:rPr lang="en-US" altLang="zh-TW" dirty="0" smtClean="0"/>
               <a:t>Tri-</a:t>
             </a:r>
             <a:r>
@@ -3272,7 +3418,7 @@
 </p:sld>
 </file>
 
-<file path=ppt/slides/slide12.xml><?xml version="1.0" encoding="utf-8"?>
+<file path=ppt/slides/slide13.xml><?xml version="1.0" encoding="utf-8"?>
 <p:sld xmlns:a="http://schemas.openxmlformats.org/drawingml/2006/main" xmlns:r="http://schemas.openxmlformats.org/officeDocument/2006/relationships" xmlns:p="http://schemas.openxmlformats.org/presentationml/2006/main">
   <p:cSld>
     <p:spTree>
@@ -3332,7 +3478,7 @@
 </p:sld>
 </file>
 
-<file path=ppt/slides/slide13.xml><?xml version="1.0" encoding="utf-8"?>
+<file path=ppt/slides/slide14.xml><?xml version="1.0" encoding="utf-8"?>
 <p:sld xmlns:a="http://schemas.openxmlformats.org/drawingml/2006/main" xmlns:r="http://schemas.openxmlformats.org/officeDocument/2006/relationships" xmlns:p="http://schemas.openxmlformats.org/presentationml/2006/main">
   <p:cSld>
     <p:spTree>
@@ -3420,88 +3566,6 @@
 </p:sld>
 </file>
 
-<file path=ppt/slides/slide14.xml><?xml version="1.0" encoding="utf-8"?>
-<p:sld xmlns:a="http://schemas.openxmlformats.org/drawingml/2006/main" xmlns:r="http://schemas.openxmlformats.org/officeDocument/2006/relationships" xmlns:p="http://schemas.openxmlformats.org/presentationml/2006/main">
-  <p:cSld>
-    <p:spTree>
-      <p:nvGrpSpPr>
-        <p:cNvPr id="1" name=""/>
-        <p:cNvGrpSpPr/>
-        <p:nvPr/>
-      </p:nvGrpSpPr>
-      <p:grpSpPr>
-        <a:xfrm>
-          <a:off x="0" y="0"/>
-          <a:ext cx="0" cy="0"/>
-          <a:chOff x="0" y="0"/>
-          <a:chExt cx="0" cy="0"/>
-        </a:xfrm>
-      </p:grpSpPr>
-      <p:sp>
-        <p:nvSpPr>
-          <p:cNvPr id="2" name="標題 1"/>
-          <p:cNvSpPr>
-            <a:spLocks noGrp="1"/>
-          </p:cNvSpPr>
-          <p:nvPr>
-            <p:ph type="title"/>
-          </p:nvPr>
-        </p:nvSpPr>
-        <p:spPr/>
-        <p:txBody>
-          <a:bodyPr/>
-          <a:lstStyle/>
-          <a:p>
-            <a:r>
-              <a:rPr lang="en-US" altLang="zh-TW" dirty="0" smtClean="0"/>
-              <a:t>Triplet loss</a:t>
-            </a:r>
-            <a:endParaRPr lang="zh-TW" altLang="en-US" dirty="0"/>
-          </a:p>
-        </p:txBody>
-      </p:sp>
-      <p:pic>
-        <p:nvPicPr>
-          <p:cNvPr id="4" name="內容版面配置區 3" descr="畫面剪輯"/>
-          <p:cNvPicPr>
-            <a:picLocks noGrp="1" noChangeAspect="1"/>
-          </p:cNvPicPr>
-          <p:nvPr>
-            <p:ph idx="1"/>
-          </p:nvPr>
-        </p:nvPicPr>
-        <p:blipFill>
-          <a:blip r:embed="rId2">
-            <a:extLst>
-              <a:ext uri="{28A0092B-C50C-407E-A947-70E740481C1C}">
-                <a14:useLocalDpi xmlns:a14="http://schemas.microsoft.com/office/drawing/2010/main" val="0"/>
-              </a:ext>
-            </a:extLst>
-          </a:blip>
-          <a:stretch>
-            <a:fillRect/>
-          </a:stretch>
-        </p:blipFill>
-        <p:spPr>
-          <a:xfrm>
-            <a:off x="1261600" y="2281810"/>
-            <a:ext cx="6620799" cy="3162742"/>
-          </a:xfrm>
-        </p:spPr>
-      </p:pic>
-    </p:spTree>
-    <p:extLst>
-      <p:ext uri="{BB962C8B-B14F-4D97-AF65-F5344CB8AC3E}">
-        <p14:creationId xmlns:p14="http://schemas.microsoft.com/office/powerpoint/2010/main" val="1986470718"/>
-      </p:ext>
-    </p:extLst>
-  </p:cSld>
-  <p:clrMapOvr>
-    <a:masterClrMapping/>
-  </p:clrMapOvr>
-</p:sld>
-</file>
-
 <file path=ppt/slides/slide15.xml><?xml version="1.0" encoding="utf-8"?>
 <p:sld xmlns:a="http://schemas.openxmlformats.org/drawingml/2006/main" xmlns:r="http://schemas.openxmlformats.org/officeDocument/2006/relationships" xmlns:p="http://schemas.openxmlformats.org/presentationml/2006/main">
   <p:cSld>
@@ -3536,7 +3600,7 @@
           <a:p>
             <a:r>
               <a:rPr lang="en-US" altLang="zh-TW" dirty="0" smtClean="0"/>
-              <a:t>Reconstruction loss</a:t>
+              <a:t>Triplet loss</a:t>
             </a:r>
             <a:endParaRPr lang="zh-TW" altLang="en-US" dirty="0"/>
           </a:p>
@@ -3544,11 +3608,13 @@
       </p:sp>
       <p:pic>
         <p:nvPicPr>
-          <p:cNvPr id="4" name="圖片 3" descr="畫面剪輯"/>
+          <p:cNvPr id="4" name="內容版面配置區 3" descr="畫面剪輯"/>
           <p:cNvPicPr>
-            <a:picLocks noChangeAspect="1"/>
+            <a:picLocks noGrp="1" noChangeAspect="1"/>
           </p:cNvPicPr>
-          <p:nvPr/>
+          <p:nvPr>
+            <p:ph idx="1"/>
+          </p:nvPr>
         </p:nvPicPr>
         <p:blipFill>
           <a:blip r:embed="rId2">
@@ -3564,48 +3630,15 @@
         </p:blipFill>
         <p:spPr>
           <a:xfrm>
-            <a:off x="0" y="1340768"/>
-            <a:ext cx="9144000" cy="2304255"/>
-          </a:xfrm>
-          <a:prstGeom prst="rect">
-            <a:avLst/>
-          </a:prstGeom>
-        </p:spPr>
-      </p:pic>
-      <p:pic>
-        <p:nvPicPr>
-          <p:cNvPr id="6" name="圖片 5" descr="畫面剪輯"/>
-          <p:cNvPicPr>
-            <a:picLocks noChangeAspect="1"/>
-          </p:cNvPicPr>
-          <p:nvPr/>
-        </p:nvPicPr>
-        <p:blipFill>
-          <a:blip r:embed="rId3">
-            <a:extLst>
-              <a:ext uri="{28A0092B-C50C-407E-A947-70E740481C1C}">
-                <a14:useLocalDpi xmlns:a14="http://schemas.microsoft.com/office/drawing/2010/main" val="0"/>
-              </a:ext>
-            </a:extLst>
-          </a:blip>
-          <a:stretch>
-            <a:fillRect/>
-          </a:stretch>
-        </p:blipFill>
-        <p:spPr>
-          <a:xfrm>
-            <a:off x="30805" y="3861049"/>
-            <a:ext cx="9144000" cy="2304255"/>
-          </a:xfrm>
-          <a:prstGeom prst="rect">
-            <a:avLst/>
-          </a:prstGeom>
+            <a:off x="1261600" y="2281810"/>
+            <a:ext cx="6620799" cy="3162742"/>
+          </a:xfrm>
         </p:spPr>
       </p:pic>
     </p:spTree>
     <p:extLst>
       <p:ext uri="{BB962C8B-B14F-4D97-AF65-F5344CB8AC3E}">
-        <p14:creationId xmlns:p14="http://schemas.microsoft.com/office/powerpoint/2010/main" val="2918896627"/>
+        <p14:creationId xmlns:p14="http://schemas.microsoft.com/office/powerpoint/2010/main" val="1986470718"/>
       </p:ext>
     </p:extLst>
   </p:cSld>
@@ -3649,89 +3682,82 @@
           <a:p>
             <a:r>
               <a:rPr lang="en-US" altLang="zh-TW" dirty="0" smtClean="0"/>
-              <a:t>Sampling</a:t>
+              <a:t>Reconstruction loss</a:t>
             </a:r>
             <a:endParaRPr lang="zh-TW" altLang="en-US" dirty="0"/>
           </a:p>
         </p:txBody>
       </p:sp>
-      <p:sp>
-        <p:nvSpPr>
-          <p:cNvPr id="3" name="內容版面配置區 2"/>
-          <p:cNvSpPr>
-            <a:spLocks noGrp="1"/>
-          </p:cNvSpPr>
-          <p:nvPr>
-            <p:ph idx="1"/>
-          </p:nvPr>
-        </p:nvSpPr>
-        <p:spPr/>
-        <p:txBody>
-          <a:bodyPr/>
-          <a:lstStyle/>
-          <a:p>
-            <a:r>
-              <a:rPr lang="en-US" altLang="zh-TW" dirty="0" smtClean="0"/>
-              <a:t>A1,A2,A3,A4</a:t>
-            </a:r>
-          </a:p>
-          <a:p>
-            <a:r>
-              <a:rPr lang="en-US" altLang="zh-TW" dirty="0" smtClean="0"/>
-              <a:t>B1,B2,B3,B4</a:t>
-            </a:r>
-          </a:p>
-          <a:p>
-            <a:r>
-              <a:rPr lang="en-US" altLang="zh-TW" dirty="0" smtClean="0"/>
-              <a:t>C1,C2,C3,C4</a:t>
-            </a:r>
-          </a:p>
-          <a:p>
-            <a:r>
-              <a:rPr lang="en-US" altLang="zh-TW" dirty="0" smtClean="0"/>
-              <a:t>D1,D2,D3,D4</a:t>
-            </a:r>
-            <a:endParaRPr lang="en-US" altLang="zh-TW" dirty="0"/>
-          </a:p>
-          <a:p>
-            <a:pPr marL="0" indent="0">
-              <a:buNone/>
-            </a:pPr>
-            <a:endParaRPr lang="en-US" altLang="zh-TW" dirty="0" smtClean="0"/>
-          </a:p>
-          <a:p>
-            <a:r>
-              <a:rPr lang="en-US" altLang="zh-TW" dirty="0" smtClean="0"/>
-              <a:t>(A1,A2,B1),(A2,A3,C1),(A3,A4,D1)</a:t>
-            </a:r>
-          </a:p>
-          <a:p>
-            <a:r>
-              <a:rPr lang="en-US" altLang="zh-TW" dirty="0" smtClean="0"/>
-              <a:t>(B1,B2,C1)</a:t>
-            </a:r>
-            <a:endParaRPr lang="zh-TW" altLang="en-US" dirty="0"/>
-          </a:p>
-        </p:txBody>
-      </p:sp>
+      <p:pic>
+        <p:nvPicPr>
+          <p:cNvPr id="4" name="圖片 3" descr="畫面剪輯"/>
+          <p:cNvPicPr>
+            <a:picLocks noChangeAspect="1"/>
+          </p:cNvPicPr>
+          <p:nvPr/>
+        </p:nvPicPr>
+        <p:blipFill>
+          <a:blip r:embed="rId2">
+            <a:extLst>
+              <a:ext uri="{28A0092B-C50C-407E-A947-70E740481C1C}">
+                <a14:useLocalDpi xmlns:a14="http://schemas.microsoft.com/office/drawing/2010/main" val="0"/>
+              </a:ext>
+            </a:extLst>
+          </a:blip>
+          <a:stretch>
+            <a:fillRect/>
+          </a:stretch>
+        </p:blipFill>
+        <p:spPr>
+          <a:xfrm>
+            <a:off x="0" y="1340768"/>
+            <a:ext cx="9144000" cy="2304255"/>
+          </a:xfrm>
+          <a:prstGeom prst="rect">
+            <a:avLst/>
+          </a:prstGeom>
+        </p:spPr>
+      </p:pic>
+      <p:pic>
+        <p:nvPicPr>
+          <p:cNvPr id="6" name="圖片 5" descr="畫面剪輯"/>
+          <p:cNvPicPr>
+            <a:picLocks noChangeAspect="1"/>
+          </p:cNvPicPr>
+          <p:nvPr/>
+        </p:nvPicPr>
+        <p:blipFill>
+          <a:blip r:embed="rId3">
+            <a:extLst>
+              <a:ext uri="{28A0092B-C50C-407E-A947-70E740481C1C}">
+                <a14:useLocalDpi xmlns:a14="http://schemas.microsoft.com/office/drawing/2010/main" val="0"/>
+              </a:ext>
+            </a:extLst>
+          </a:blip>
+          <a:stretch>
+            <a:fillRect/>
+          </a:stretch>
+        </p:blipFill>
+        <p:spPr>
+          <a:xfrm>
+            <a:off x="30805" y="3861049"/>
+            <a:ext cx="9144000" cy="2304255"/>
+          </a:xfrm>
+          <a:prstGeom prst="rect">
+            <a:avLst/>
+          </a:prstGeom>
+        </p:spPr>
+      </p:pic>
     </p:spTree>
     <p:extLst>
       <p:ext uri="{BB962C8B-B14F-4D97-AF65-F5344CB8AC3E}">
-        <p14:creationId xmlns:p14="http://schemas.microsoft.com/office/powerpoint/2010/main" val="1049880529"/>
+        <p14:creationId xmlns:p14="http://schemas.microsoft.com/office/powerpoint/2010/main" val="2918896627"/>
       </p:ext>
     </p:extLst>
   </p:cSld>
   <p:clrMapOvr>
     <a:masterClrMapping/>
   </p:clrMapOvr>
-  <p:timing>
-    <p:tnLst>
-      <p:par>
-        <p:cTn id="1" dur="indefinite" restart="never" nodeType="tmRoot"/>
-      </p:par>
-    </p:tnLst>
-  </p:timing>
 </p:sld>
 </file>
 
@@ -3754,7 +3780,7 @@
       </p:grpSpPr>
       <p:sp>
         <p:nvSpPr>
-          <p:cNvPr id="6" name="標題 1"/>
+          <p:cNvPr id="2" name="標題 1"/>
           <p:cNvSpPr>
             <a:spLocks noGrp="1"/>
           </p:cNvSpPr>
@@ -3762,58 +3788,83 @@
             <p:ph type="title"/>
           </p:nvPr>
         </p:nvSpPr>
-        <p:spPr>
-          <a:xfrm>
-            <a:off x="457200" y="274638"/>
-            <a:ext cx="8229600" cy="1143000"/>
-          </a:xfrm>
-        </p:spPr>
+        <p:spPr/>
         <p:txBody>
           <a:bodyPr/>
           <a:lstStyle/>
           <a:p>
             <a:r>
               <a:rPr lang="en-US" altLang="zh-TW" dirty="0" smtClean="0"/>
-              <a:t>loss</a:t>
+              <a:t>Sampling</a:t>
             </a:r>
             <a:endParaRPr lang="zh-TW" altLang="en-US" dirty="0"/>
           </a:p>
         </p:txBody>
       </p:sp>
-      <p:pic>
-        <p:nvPicPr>
-          <p:cNvPr id="2" name="圖片 1" descr="畫面剪輯"/>
-          <p:cNvPicPr>
-            <a:picLocks noChangeAspect="1"/>
-          </p:cNvPicPr>
-          <p:nvPr/>
-        </p:nvPicPr>
-        <p:blipFill>
-          <a:blip r:embed="rId2">
-            <a:extLst>
-              <a:ext uri="{28A0092B-C50C-407E-A947-70E740481C1C}">
-                <a14:useLocalDpi xmlns:a14="http://schemas.microsoft.com/office/drawing/2010/main" val="0"/>
-              </a:ext>
-            </a:extLst>
-          </a:blip>
-          <a:stretch>
-            <a:fillRect/>
-          </a:stretch>
-        </p:blipFill>
-        <p:spPr>
-          <a:xfrm>
-            <a:off x="1331639" y="1916832"/>
-            <a:ext cx="6725589" cy="3229426"/>
-          </a:xfrm>
-          <a:prstGeom prst="rect">
-            <a:avLst/>
-          </a:prstGeom>
-        </p:spPr>
-      </p:pic>
+      <p:sp>
+        <p:nvSpPr>
+          <p:cNvPr id="3" name="內容版面配置區 2"/>
+          <p:cNvSpPr>
+            <a:spLocks noGrp="1"/>
+          </p:cNvSpPr>
+          <p:nvPr>
+            <p:ph idx="1"/>
+          </p:nvPr>
+        </p:nvSpPr>
+        <p:spPr/>
+        <p:txBody>
+          <a:bodyPr/>
+          <a:lstStyle/>
+          <a:p>
+            <a:r>
+              <a:rPr lang="en-US" altLang="zh-TW" dirty="0" smtClean="0"/>
+              <a:t>A1,A2,A3,A4</a:t>
+            </a:r>
+          </a:p>
+          <a:p>
+            <a:r>
+              <a:rPr lang="en-US" altLang="zh-TW" dirty="0" smtClean="0"/>
+              <a:t>B1,B2,B3,B4</a:t>
+            </a:r>
+          </a:p>
+          <a:p>
+            <a:r>
+              <a:rPr lang="en-US" altLang="zh-TW" dirty="0" smtClean="0"/>
+              <a:t>C1,C2,C3,C4</a:t>
+            </a:r>
+          </a:p>
+          <a:p>
+            <a:r>
+              <a:rPr lang="en-US" altLang="zh-TW" dirty="0" smtClean="0"/>
+              <a:t>D1,D2,D3,D4</a:t>
+            </a:r>
+            <a:endParaRPr lang="en-US" altLang="zh-TW" dirty="0"/>
+          </a:p>
+          <a:p>
+            <a:pPr marL="0" indent="0">
+              <a:buNone/>
+            </a:pPr>
+            <a:endParaRPr lang="en-US" altLang="zh-TW" dirty="0" smtClean="0"/>
+          </a:p>
+          <a:p>
+            <a:r>
+              <a:rPr lang="en-US" altLang="zh-TW" dirty="0" smtClean="0"/>
+              <a:t>(A1,A2,B1),(A2,A3,C1),(A3,A4,D1)</a:t>
+            </a:r>
+          </a:p>
+          <a:p>
+            <a:r>
+              <a:rPr lang="en-US" altLang="zh-TW" dirty="0" smtClean="0"/>
+              <a:t>(B1,B2,C1)</a:t>
+            </a:r>
+            <a:endParaRPr lang="zh-TW" altLang="en-US" dirty="0"/>
+          </a:p>
+        </p:txBody>
+      </p:sp>
     </p:spTree>
     <p:extLst>
       <p:ext uri="{BB962C8B-B14F-4D97-AF65-F5344CB8AC3E}">
-        <p14:creationId xmlns:p14="http://schemas.microsoft.com/office/powerpoint/2010/main" val="2665228350"/>
+        <p14:creationId xmlns:p14="http://schemas.microsoft.com/office/powerpoint/2010/main" val="1049880529"/>
       </p:ext>
     </p:extLst>
   </p:cSld>
@@ -3849,7 +3900,7 @@
       </p:grpSpPr>
       <p:sp>
         <p:nvSpPr>
-          <p:cNvPr id="2" name="標題 1"/>
+          <p:cNvPr id="6" name="標題 1"/>
           <p:cNvSpPr>
             <a:spLocks noGrp="1"/>
           </p:cNvSpPr>
@@ -3857,14 +3908,19 @@
             <p:ph type="title"/>
           </p:nvPr>
         </p:nvSpPr>
-        <p:spPr/>
+        <p:spPr>
+          <a:xfrm>
+            <a:off x="457200" y="274638"/>
+            <a:ext cx="8229600" cy="1143000"/>
+          </a:xfrm>
+        </p:spPr>
         <p:txBody>
           <a:bodyPr/>
           <a:lstStyle/>
           <a:p>
             <a:r>
               <a:rPr lang="en-US" altLang="zh-TW" dirty="0" smtClean="0"/>
-              <a:t>Triplet loss</a:t>
+              <a:t>loss</a:t>
             </a:r>
             <a:endParaRPr lang="zh-TW" altLang="en-US" dirty="0"/>
           </a:p>
@@ -3872,7 +3928,7 @@
       </p:sp>
       <p:pic>
         <p:nvPicPr>
-          <p:cNvPr id="3" name="圖片 2" descr="畫面剪輯"/>
+          <p:cNvPr id="2" name="圖片 1" descr="畫面剪輯"/>
           <p:cNvPicPr>
             <a:picLocks noChangeAspect="1"/>
           </p:cNvPicPr>
@@ -3892,8 +3948,8 @@
         </p:blipFill>
         <p:spPr>
           <a:xfrm>
-            <a:off x="1147537" y="1988840"/>
-            <a:ext cx="6820852" cy="3162742"/>
+            <a:off x="1331639" y="1916832"/>
+            <a:ext cx="6725589" cy="3229426"/>
           </a:xfrm>
           <a:prstGeom prst="rect">
             <a:avLst/>
@@ -3903,7 +3959,7 @@
     </p:spTree>
     <p:extLst>
       <p:ext uri="{BB962C8B-B14F-4D97-AF65-F5344CB8AC3E}">
-        <p14:creationId xmlns:p14="http://schemas.microsoft.com/office/powerpoint/2010/main" val="221206423"/>
+        <p14:creationId xmlns:p14="http://schemas.microsoft.com/office/powerpoint/2010/main" val="2665228350"/>
       </p:ext>
     </p:extLst>
   </p:cSld>
@@ -3954,7 +4010,7 @@
           <a:p>
             <a:r>
               <a:rPr lang="en-US" altLang="zh-TW" dirty="0" smtClean="0"/>
-              <a:t>Reconstruction loss</a:t>
+              <a:t>Triplet loss</a:t>
             </a:r>
             <a:endParaRPr lang="zh-TW" altLang="en-US" dirty="0"/>
           </a:p>
@@ -3982,38 +4038,8 @@
         </p:blipFill>
         <p:spPr>
           <a:xfrm>
-            <a:off x="683568" y="1191044"/>
-            <a:ext cx="7560840" cy="2381972"/>
-          </a:xfrm>
-          <a:prstGeom prst="rect">
-            <a:avLst/>
-          </a:prstGeom>
-        </p:spPr>
-      </p:pic>
-      <p:pic>
-        <p:nvPicPr>
-          <p:cNvPr id="5" name="圖片 4" descr="畫面剪輯"/>
-          <p:cNvPicPr>
-            <a:picLocks noChangeAspect="1"/>
-          </p:cNvPicPr>
-          <p:nvPr/>
-        </p:nvPicPr>
-        <p:blipFill>
-          <a:blip r:embed="rId3">
-            <a:extLst>
-              <a:ext uri="{28A0092B-C50C-407E-A947-70E740481C1C}">
-                <a14:useLocalDpi xmlns:a14="http://schemas.microsoft.com/office/drawing/2010/main" val="0"/>
-              </a:ext>
-            </a:extLst>
-          </a:blip>
-          <a:stretch>
-            <a:fillRect/>
-          </a:stretch>
-        </p:blipFill>
-        <p:spPr>
-          <a:xfrm>
-            <a:off x="683568" y="3903969"/>
-            <a:ext cx="7560840" cy="2376264"/>
+            <a:off x="1147537" y="1988840"/>
+            <a:ext cx="6820852" cy="3162742"/>
           </a:xfrm>
           <a:prstGeom prst="rect">
             <a:avLst/>
@@ -4023,7 +4049,7 @@
     </p:spTree>
     <p:extLst>
       <p:ext uri="{BB962C8B-B14F-4D97-AF65-F5344CB8AC3E}">
-        <p14:creationId xmlns:p14="http://schemas.microsoft.com/office/powerpoint/2010/main" val="2264746599"/>
+        <p14:creationId xmlns:p14="http://schemas.microsoft.com/office/powerpoint/2010/main" val="221206423"/>
       </p:ext>
     </p:extLst>
   </p:cSld>
@@ -4318,153 +4344,76 @@
           <a:p>
             <a:r>
               <a:rPr lang="en-US" altLang="zh-TW" dirty="0" smtClean="0"/>
-              <a:t>Sampling</a:t>
+              <a:t>Reconstruction loss</a:t>
             </a:r>
             <a:endParaRPr lang="zh-TW" altLang="en-US" dirty="0"/>
           </a:p>
         </p:txBody>
       </p:sp>
-      <p:sp>
-        <p:nvSpPr>
-          <p:cNvPr id="3" name="內容版面配置區 2"/>
-          <p:cNvSpPr>
-            <a:spLocks noGrp="1"/>
-          </p:cNvSpPr>
-          <p:nvPr>
-            <p:ph idx="1"/>
-          </p:nvPr>
-        </p:nvSpPr>
-        <p:spPr/>
-        <p:txBody>
-          <a:bodyPr>
-            <a:normAutofit fontScale="85000" lnSpcReduction="20000"/>
-          </a:bodyPr>
-          <a:lstStyle/>
-          <a:p>
-            <a:r>
-              <a:rPr lang="en-US" altLang="zh-TW" dirty="0" smtClean="0"/>
-              <a:t>A1,A2,A3,A4</a:t>
-            </a:r>
-          </a:p>
-          <a:p>
-            <a:r>
-              <a:rPr lang="en-US" altLang="zh-TW" dirty="0" smtClean="0"/>
-              <a:t>B1,B2,B3,B4</a:t>
-            </a:r>
-          </a:p>
-          <a:p>
-            <a:r>
-              <a:rPr lang="en-US" altLang="zh-TW" dirty="0" smtClean="0"/>
-              <a:t>C1,C2,C3,C4</a:t>
-            </a:r>
-          </a:p>
-          <a:p>
-            <a:r>
-              <a:rPr lang="en-US" altLang="zh-TW" dirty="0" smtClean="0"/>
-              <a:t>D1,D2,D3,D4</a:t>
-            </a:r>
-            <a:endParaRPr lang="en-US" altLang="zh-TW" dirty="0"/>
-          </a:p>
-          <a:p>
-            <a:pPr marL="0" indent="0">
-              <a:buNone/>
-            </a:pPr>
-            <a:r>
-              <a:rPr lang="en-US" altLang="zh-TW" dirty="0" smtClean="0"/>
-              <a:t>Hyper parameter : P=2,K=2</a:t>
-            </a:r>
-          </a:p>
-          <a:p>
-            <a:pPr marL="0" indent="0">
-              <a:buNone/>
-            </a:pPr>
-            <a:r>
-              <a:rPr lang="en-US" altLang="zh-TW" dirty="0" smtClean="0"/>
-              <a:t>Random : P=(A,B) K=(A1,A2),(B1,B2)</a:t>
-            </a:r>
-          </a:p>
-          <a:p>
-            <a:pPr marL="0" indent="0">
-              <a:buNone/>
-            </a:pPr>
-            <a:r>
-              <a:rPr lang="en-US" altLang="zh-TW" dirty="0" smtClean="0"/>
-              <a:t>Sample=</a:t>
-            </a:r>
-          </a:p>
-          <a:p>
-            <a:pPr marL="0" indent="0">
-              <a:buNone/>
-            </a:pPr>
-            <a:r>
-              <a:rPr lang="en-US" altLang="zh-TW" dirty="0" smtClean="0"/>
-              <a:t>(A1,A2,B1),</a:t>
-            </a:r>
-            <a:r>
-              <a:rPr lang="en-US" altLang="zh-TW" dirty="0"/>
-              <a:t> (A1,A2,B1</a:t>
-            </a:r>
-            <a:r>
-              <a:rPr lang="en-US" altLang="zh-TW" dirty="0" smtClean="0"/>
-              <a:t>),(A2,A1,B1), </a:t>
-            </a:r>
-            <a:r>
-              <a:rPr lang="en-US" altLang="zh-TW" dirty="0"/>
-              <a:t>(</a:t>
-            </a:r>
-            <a:r>
-              <a:rPr lang="en-US" altLang="zh-TW" dirty="0" smtClean="0"/>
-              <a:t>A2,A1,B2)</a:t>
-            </a:r>
-          </a:p>
-          <a:p>
-            <a:pPr marL="0" indent="0">
-              <a:buNone/>
-            </a:pPr>
-            <a:r>
-              <a:rPr lang="en-US" altLang="zh-TW" dirty="0" smtClean="0"/>
-              <a:t>(B1,B2,A1</a:t>
-            </a:r>
-            <a:r>
-              <a:rPr lang="en-US" altLang="zh-TW" dirty="0"/>
-              <a:t>), </a:t>
-            </a:r>
-            <a:r>
-              <a:rPr lang="en-US" altLang="zh-TW" dirty="0" smtClean="0"/>
-              <a:t>(B1,B2,A1),(B2,B1,A1</a:t>
-            </a:r>
-            <a:r>
-              <a:rPr lang="en-US" altLang="zh-TW" dirty="0"/>
-              <a:t>), </a:t>
-            </a:r>
-            <a:r>
-              <a:rPr lang="en-US" altLang="zh-TW" dirty="0" smtClean="0"/>
-              <a:t>(B2,B1,A2)</a:t>
-            </a:r>
-          </a:p>
-          <a:p>
-            <a:pPr marL="0" indent="0">
-              <a:buNone/>
-            </a:pPr>
-            <a:r>
-              <a:rPr lang="en-US" altLang="zh-TW" dirty="0" smtClean="0"/>
-              <a:t>Size of </a:t>
-            </a:r>
-            <a:r>
-              <a:rPr lang="en-US" altLang="zh-TW" dirty="0" err="1" smtClean="0"/>
-              <a:t>Batch:PK</a:t>
-            </a:r>
-            <a:r>
-              <a:rPr lang="en-US" altLang="zh-TW" dirty="0" smtClean="0"/>
-              <a:t>(K-1)(PK-K)</a:t>
-            </a:r>
-          </a:p>
-        </p:txBody>
-      </p:sp>
+      <p:pic>
+        <p:nvPicPr>
+          <p:cNvPr id="3" name="圖片 2" descr="畫面剪輯"/>
+          <p:cNvPicPr>
+            <a:picLocks noChangeAspect="1"/>
+          </p:cNvPicPr>
+          <p:nvPr/>
+        </p:nvPicPr>
+        <p:blipFill>
+          <a:blip r:embed="rId2">
+            <a:extLst>
+              <a:ext uri="{28A0092B-C50C-407E-A947-70E740481C1C}">
+                <a14:useLocalDpi xmlns:a14="http://schemas.microsoft.com/office/drawing/2010/main" val="0"/>
+              </a:ext>
+            </a:extLst>
+          </a:blip>
+          <a:stretch>
+            <a:fillRect/>
+          </a:stretch>
+        </p:blipFill>
+        <p:spPr>
+          <a:xfrm>
+            <a:off x="683568" y="1191044"/>
+            <a:ext cx="7560840" cy="2381972"/>
+          </a:xfrm>
+          <a:prstGeom prst="rect">
+            <a:avLst/>
+          </a:prstGeom>
+        </p:spPr>
+      </p:pic>
+      <p:pic>
+        <p:nvPicPr>
+          <p:cNvPr id="5" name="圖片 4" descr="畫面剪輯"/>
+          <p:cNvPicPr>
+            <a:picLocks noChangeAspect="1"/>
+          </p:cNvPicPr>
+          <p:nvPr/>
+        </p:nvPicPr>
+        <p:blipFill>
+          <a:blip r:embed="rId3">
+            <a:extLst>
+              <a:ext uri="{28A0092B-C50C-407E-A947-70E740481C1C}">
+                <a14:useLocalDpi xmlns:a14="http://schemas.microsoft.com/office/drawing/2010/main" val="0"/>
+              </a:ext>
+            </a:extLst>
+          </a:blip>
+          <a:stretch>
+            <a:fillRect/>
+          </a:stretch>
+        </p:blipFill>
+        <p:spPr>
+          <a:xfrm>
+            <a:off x="683568" y="3903969"/>
+            <a:ext cx="7560840" cy="2376264"/>
+          </a:xfrm>
+          <a:prstGeom prst="rect">
+            <a:avLst/>
+          </a:prstGeom>
+        </p:spPr>
+      </p:pic>
     </p:spTree>
     <p:extLst>
       <p:ext uri="{BB962C8B-B14F-4D97-AF65-F5344CB8AC3E}">
-        <p14:creationId xmlns:p14="http://schemas.microsoft.com/office/powerpoint/2010/main" val="2383280399"/>
+        <p14:creationId xmlns:p14="http://schemas.microsoft.com/office/powerpoint/2010/main" val="2264746599"/>
       </p:ext>
     </p:extLst>
   </p:cSld>
@@ -4498,69 +4447,170 @@
           <a:chExt cx="0" cy="0"/>
         </a:xfrm>
       </p:grpSpPr>
-      <p:pic>
-        <p:nvPicPr>
-          <p:cNvPr id="4" name="內容版面配置區 3" descr="畫面剪輯"/>
-          <p:cNvPicPr>
-            <a:picLocks noGrp="1" noChangeAspect="1"/>
-          </p:cNvPicPr>
+      <p:sp>
+        <p:nvSpPr>
+          <p:cNvPr id="2" name="標題 1"/>
+          <p:cNvSpPr>
+            <a:spLocks noGrp="1"/>
+          </p:cNvSpPr>
+          <p:nvPr>
+            <p:ph type="title"/>
+          </p:nvPr>
+        </p:nvSpPr>
+        <p:spPr/>
+        <p:txBody>
+          <a:bodyPr/>
+          <a:lstStyle/>
+          <a:p>
+            <a:r>
+              <a:rPr lang="en-US" altLang="zh-TW" dirty="0" smtClean="0"/>
+              <a:t>Sampling</a:t>
+            </a:r>
+            <a:endParaRPr lang="zh-TW" altLang="en-US" dirty="0"/>
+          </a:p>
+        </p:txBody>
+      </p:sp>
+      <p:sp>
+        <p:nvSpPr>
+          <p:cNvPr id="3" name="內容版面配置區 2"/>
+          <p:cNvSpPr>
+            <a:spLocks noGrp="1"/>
+          </p:cNvSpPr>
           <p:nvPr>
             <p:ph idx="1"/>
           </p:nvPr>
-        </p:nvPicPr>
-        <p:blipFill>
-          <a:blip r:embed="rId2">
-            <a:extLst>
-              <a:ext uri="{28A0092B-C50C-407E-A947-70E740481C1C}">
-                <a14:useLocalDpi xmlns:a14="http://schemas.microsoft.com/office/drawing/2010/main" val="0"/>
-              </a:ext>
-            </a:extLst>
-          </a:blip>
-          <a:stretch>
-            <a:fillRect/>
-          </a:stretch>
-        </p:blipFill>
-        <p:spPr>
-          <a:xfrm>
-            <a:off x="2267744" y="1844824"/>
-            <a:ext cx="4887541" cy="4525963"/>
-          </a:xfrm>
-        </p:spPr>
-      </p:pic>
-      <p:pic>
-        <p:nvPicPr>
-          <p:cNvPr id="6" name="圖片 5" descr="畫面剪輯"/>
-          <p:cNvPicPr>
-            <a:picLocks noChangeAspect="1"/>
-          </p:cNvPicPr>
-          <p:nvPr/>
-        </p:nvPicPr>
-        <p:blipFill>
-          <a:blip r:embed="rId3">
-            <a:extLst>
-              <a:ext uri="{28A0092B-C50C-407E-A947-70E740481C1C}">
-                <a14:useLocalDpi xmlns:a14="http://schemas.microsoft.com/office/drawing/2010/main" val="0"/>
-              </a:ext>
-            </a:extLst>
-          </a:blip>
-          <a:stretch>
-            <a:fillRect/>
-          </a:stretch>
-        </p:blipFill>
-        <p:spPr>
-          <a:xfrm>
-            <a:off x="2987824" y="980728"/>
-            <a:ext cx="3381847" cy="362001"/>
-          </a:xfrm>
-          <a:prstGeom prst="rect">
-            <a:avLst/>
-          </a:prstGeom>
-        </p:spPr>
-      </p:pic>
+        </p:nvSpPr>
+        <p:spPr/>
+        <p:txBody>
+          <a:bodyPr>
+            <a:normAutofit fontScale="85000" lnSpcReduction="20000"/>
+          </a:bodyPr>
+          <a:lstStyle/>
+          <a:p>
+            <a:r>
+              <a:rPr lang="en-US" altLang="zh-TW" dirty="0" smtClean="0"/>
+              <a:t>A1,A2,A3,A4</a:t>
+            </a:r>
+          </a:p>
+          <a:p>
+            <a:r>
+              <a:rPr lang="en-US" altLang="zh-TW" dirty="0" smtClean="0"/>
+              <a:t>B1,B2,B3,B4</a:t>
+            </a:r>
+          </a:p>
+          <a:p>
+            <a:r>
+              <a:rPr lang="en-US" altLang="zh-TW" dirty="0" smtClean="0"/>
+              <a:t>C1,C2,C3,C4</a:t>
+            </a:r>
+          </a:p>
+          <a:p>
+            <a:r>
+              <a:rPr lang="en-US" altLang="zh-TW" dirty="0" smtClean="0"/>
+              <a:t>D1,D2,D3,D4</a:t>
+            </a:r>
+            <a:endParaRPr lang="en-US" altLang="zh-TW" dirty="0"/>
+          </a:p>
+          <a:p>
+            <a:pPr marL="0" indent="0">
+              <a:buNone/>
+            </a:pPr>
+            <a:r>
+              <a:rPr lang="en-US" altLang="zh-TW" dirty="0" smtClean="0"/>
+              <a:t>Hyper parameter : P=2,K=2</a:t>
+            </a:r>
+          </a:p>
+          <a:p>
+            <a:pPr marL="0" indent="0">
+              <a:buNone/>
+            </a:pPr>
+            <a:r>
+              <a:rPr lang="en-US" altLang="zh-TW" dirty="0" smtClean="0"/>
+              <a:t>Random : P=(A,B) K=(A1,A2),(B1,B2)</a:t>
+            </a:r>
+          </a:p>
+          <a:p>
+            <a:pPr marL="0" indent="0">
+              <a:buNone/>
+            </a:pPr>
+            <a:r>
+              <a:rPr lang="en-US" altLang="zh-TW" dirty="0" smtClean="0"/>
+              <a:t>Sample=</a:t>
+            </a:r>
+          </a:p>
+          <a:p>
+            <a:pPr marL="0" indent="0">
+              <a:buNone/>
+            </a:pPr>
+            <a:r>
+              <a:rPr lang="en-US" altLang="zh-TW" dirty="0" smtClean="0"/>
+              <a:t>(A1,A2,B1),</a:t>
+            </a:r>
+            <a:r>
+              <a:rPr lang="en-US" altLang="zh-TW" dirty="0"/>
+              <a:t> (A1,A2,B1</a:t>
+            </a:r>
+            <a:r>
+              <a:rPr lang="en-US" altLang="zh-TW" dirty="0" smtClean="0"/>
+              <a:t>),(A2,A1,B1), </a:t>
+            </a:r>
+            <a:r>
+              <a:rPr lang="en-US" altLang="zh-TW" dirty="0"/>
+              <a:t>(</a:t>
+            </a:r>
+            <a:r>
+              <a:rPr lang="en-US" altLang="zh-TW" dirty="0" smtClean="0"/>
+              <a:t>A2,A1,B2)</a:t>
+            </a:r>
+          </a:p>
+          <a:p>
+            <a:pPr marL="0" indent="0">
+              <a:buNone/>
+            </a:pPr>
+            <a:r>
+              <a:rPr lang="en-US" altLang="zh-TW" dirty="0" smtClean="0"/>
+              <a:t>(B1,B2,A1</a:t>
+            </a:r>
+            <a:r>
+              <a:rPr lang="en-US" altLang="zh-TW" dirty="0"/>
+              <a:t>), </a:t>
+            </a:r>
+            <a:r>
+              <a:rPr lang="en-US" altLang="zh-TW" dirty="0" smtClean="0"/>
+              <a:t>(B1,B2,A1),(B2,B1,A1</a:t>
+            </a:r>
+            <a:r>
+              <a:rPr lang="en-US" altLang="zh-TW" dirty="0"/>
+              <a:t>), </a:t>
+            </a:r>
+            <a:r>
+              <a:rPr lang="en-US" altLang="zh-TW" dirty="0" smtClean="0"/>
+              <a:t>(B2,B1,A2)</a:t>
+            </a:r>
+          </a:p>
+          <a:p>
+            <a:pPr marL="0" indent="0">
+              <a:buNone/>
+            </a:pPr>
+            <a:r>
+              <a:rPr lang="en-US" altLang="zh-TW" dirty="0" smtClean="0"/>
+              <a:t>Size of </a:t>
+            </a:r>
+            <a:r>
+              <a:rPr lang="en-US" altLang="zh-TW" dirty="0" err="1" smtClean="0"/>
+              <a:t>Batch:PK</a:t>
+            </a:r>
+            <a:r>
+              <a:rPr lang="en-US" altLang="zh-TW" dirty="0" smtClean="0"/>
+              <a:t>(K-1)(PK-K)</a:t>
+            </a:r>
+          </a:p>
+        </p:txBody>
+      </p:sp>
     </p:spTree>
     <p:extLst>
       <p:ext uri="{BB962C8B-B14F-4D97-AF65-F5344CB8AC3E}">
-        <p14:creationId xmlns:p14="http://schemas.microsoft.com/office/powerpoint/2010/main" val="3373913520"/>
+        <p14:creationId xmlns:p14="http://schemas.microsoft.com/office/powerpoint/2010/main" val="2383280399"/>
       </p:ext>
     </p:extLst>
   </p:cSld>
@@ -4594,41 +4644,15 @@
           <a:chExt cx="0" cy="0"/>
         </a:xfrm>
       </p:grpSpPr>
-      <p:sp>
-        <p:nvSpPr>
-          <p:cNvPr id="4" name="標題 1"/>
-          <p:cNvSpPr>
-            <a:spLocks noGrp="1"/>
-          </p:cNvSpPr>
-          <p:nvPr>
-            <p:ph type="title"/>
-          </p:nvPr>
-        </p:nvSpPr>
-        <p:spPr>
-          <a:xfrm>
-            <a:off x="457200" y="274638"/>
-            <a:ext cx="8229600" cy="1143000"/>
-          </a:xfrm>
-        </p:spPr>
-        <p:txBody>
-          <a:bodyPr/>
-          <a:lstStyle/>
-          <a:p>
-            <a:r>
-              <a:rPr lang="en-US" altLang="zh-TW" dirty="0" smtClean="0"/>
-              <a:t>loss</a:t>
-            </a:r>
-            <a:endParaRPr lang="zh-TW" altLang="en-US" dirty="0"/>
-          </a:p>
-        </p:txBody>
-      </p:sp>
       <p:pic>
         <p:nvPicPr>
-          <p:cNvPr id="6" name="圖片 5" descr="畫面剪輯"/>
+          <p:cNvPr id="4" name="內容版面配置區 3" descr="畫面剪輯"/>
           <p:cNvPicPr>
-            <a:picLocks noChangeAspect="1"/>
+            <a:picLocks noGrp="1" noChangeAspect="1"/>
           </p:cNvPicPr>
-          <p:nvPr/>
+          <p:nvPr>
+            <p:ph idx="1"/>
+          </p:nvPr>
         </p:nvPicPr>
         <p:blipFill>
           <a:blip r:embed="rId2">
@@ -4644,8 +4668,35 @@
         </p:blipFill>
         <p:spPr>
           <a:xfrm>
-            <a:off x="1285416" y="1843424"/>
-            <a:ext cx="6573168" cy="3200847"/>
+            <a:off x="2267744" y="1844824"/>
+            <a:ext cx="4887541" cy="4525963"/>
+          </a:xfrm>
+        </p:spPr>
+      </p:pic>
+      <p:pic>
+        <p:nvPicPr>
+          <p:cNvPr id="6" name="圖片 5" descr="畫面剪輯"/>
+          <p:cNvPicPr>
+            <a:picLocks noChangeAspect="1"/>
+          </p:cNvPicPr>
+          <p:nvPr/>
+        </p:nvPicPr>
+        <p:blipFill>
+          <a:blip r:embed="rId3">
+            <a:extLst>
+              <a:ext uri="{28A0092B-C50C-407E-A947-70E740481C1C}">
+                <a14:useLocalDpi xmlns:a14="http://schemas.microsoft.com/office/drawing/2010/main" val="0"/>
+              </a:ext>
+            </a:extLst>
+          </a:blip>
+          <a:stretch>
+            <a:fillRect/>
+          </a:stretch>
+        </p:blipFill>
+        <p:spPr>
+          <a:xfrm>
+            <a:off x="2987824" y="980728"/>
+            <a:ext cx="3381847" cy="362001"/>
           </a:xfrm>
           <a:prstGeom prst="rect">
             <a:avLst/>
@@ -4655,7 +4706,7 @@
     </p:spTree>
     <p:extLst>
       <p:ext uri="{BB962C8B-B14F-4D97-AF65-F5344CB8AC3E}">
-        <p14:creationId xmlns:p14="http://schemas.microsoft.com/office/powerpoint/2010/main" val="1974322127"/>
+        <p14:creationId xmlns:p14="http://schemas.microsoft.com/office/powerpoint/2010/main" val="3373913520"/>
       </p:ext>
     </p:extLst>
   </p:cSld>
@@ -4692,44 +4743,26 @@
       <p:sp>
         <p:nvSpPr>
           <p:cNvPr id="4" name="標題 1"/>
-          <p:cNvSpPr txBox="1">
-            <a:spLocks/>
-          </p:cNvSpPr>
-          <p:nvPr/>
-        </p:nvSpPr>
-        <p:spPr>
-          <a:xfrm>
-            <a:off x="609600" y="427038"/>
+          <p:cNvSpPr>
+            <a:spLocks noGrp="1"/>
+          </p:cNvSpPr>
+          <p:nvPr>
+            <p:ph type="title"/>
+          </p:nvPr>
+        </p:nvSpPr>
+        <p:spPr>
+          <a:xfrm>
+            <a:off x="457200" y="274638"/>
             <a:ext cx="8229600" cy="1143000"/>
           </a:xfrm>
-          <a:prstGeom prst="rect">
-            <a:avLst/>
-          </a:prstGeom>
-        </p:spPr>
-        <p:txBody>
-          <a:bodyPr vert="horz" lIns="91440" tIns="45720" rIns="91440" bIns="45720" rtlCol="0" anchor="ctr">
-            <a:normAutofit/>
-          </a:bodyPr>
-          <a:lstStyle>
-            <a:lvl1pPr algn="ctr" defTabSz="914400" rtl="0" eaLnBrk="1" latinLnBrk="0" hangingPunct="1">
-              <a:spcBef>
-                <a:spcPct val="0"/>
-              </a:spcBef>
-              <a:buNone/>
-              <a:defRPr sz="4400" kern="1200">
-                <a:solidFill>
-                  <a:schemeClr val="tx1"/>
-                </a:solidFill>
-                <a:latin typeface="+mj-lt"/>
-                <a:ea typeface="+mj-ea"/>
-                <a:cs typeface="+mj-cs"/>
-              </a:defRPr>
-            </a:lvl1pPr>
-          </a:lstStyle>
-          <a:p>
-            <a:r>
-              <a:rPr lang="en-US" altLang="zh-TW" smtClean="0"/>
-              <a:t>Triplet loss</a:t>
+        </p:spPr>
+        <p:txBody>
+          <a:bodyPr/>
+          <a:lstStyle/>
+          <a:p>
+            <a:r>
+              <a:rPr lang="en-US" altLang="zh-TW" dirty="0" smtClean="0"/>
+              <a:t>loss</a:t>
             </a:r>
             <a:endParaRPr lang="zh-TW" altLang="en-US" dirty="0"/>
           </a:p>
@@ -4757,8 +4790,8 @@
         </p:blipFill>
         <p:spPr>
           <a:xfrm>
-            <a:off x="1209205" y="1780945"/>
-            <a:ext cx="6725589" cy="3296110"/>
+            <a:off x="1285416" y="1843424"/>
+            <a:ext cx="6573168" cy="3200847"/>
           </a:xfrm>
           <a:prstGeom prst="rect">
             <a:avLst/>
@@ -4768,7 +4801,7 @@
     </p:spTree>
     <p:extLst>
       <p:ext uri="{BB962C8B-B14F-4D97-AF65-F5344CB8AC3E}">
-        <p14:creationId xmlns:p14="http://schemas.microsoft.com/office/powerpoint/2010/main" val="2891682036"/>
+        <p14:creationId xmlns:p14="http://schemas.microsoft.com/office/powerpoint/2010/main" val="1974322127"/>
       </p:ext>
     </p:extLst>
   </p:cSld>
@@ -4842,7 +4875,7 @@
           <a:p>
             <a:r>
               <a:rPr lang="en-US" altLang="zh-TW" smtClean="0"/>
-              <a:t>Reconstruction loss</a:t>
+              <a:t>Triplet loss</a:t>
             </a:r>
             <a:endParaRPr lang="zh-TW" altLang="en-US" dirty="0"/>
           </a:p>
@@ -4850,7 +4883,7 @@
       </p:sp>
       <p:pic>
         <p:nvPicPr>
-          <p:cNvPr id="8" name="圖片 7" descr="畫面剪輯"/>
+          <p:cNvPr id="6" name="圖片 5" descr="畫面剪輯"/>
           <p:cNvPicPr>
             <a:picLocks noChangeAspect="1"/>
           </p:cNvPicPr>
@@ -4870,38 +4903,8 @@
         </p:blipFill>
         <p:spPr>
           <a:xfrm>
-            <a:off x="710208" y="1340768"/>
-            <a:ext cx="8028384" cy="2676128"/>
-          </a:xfrm>
-          <a:prstGeom prst="rect">
-            <a:avLst/>
-          </a:prstGeom>
-        </p:spPr>
-      </p:pic>
-      <p:pic>
-        <p:nvPicPr>
-          <p:cNvPr id="9" name="圖片 8" descr="畫面剪輯"/>
-          <p:cNvPicPr>
-            <a:picLocks noChangeAspect="1"/>
-          </p:cNvPicPr>
-          <p:nvPr/>
-        </p:nvPicPr>
-        <p:blipFill>
-          <a:blip r:embed="rId3">
-            <a:extLst>
-              <a:ext uri="{28A0092B-C50C-407E-A947-70E740481C1C}">
-                <a14:useLocalDpi xmlns:a14="http://schemas.microsoft.com/office/drawing/2010/main" val="0"/>
-              </a:ext>
-            </a:extLst>
-          </a:blip>
-          <a:stretch>
-            <a:fillRect/>
-          </a:stretch>
-        </p:blipFill>
-        <p:spPr>
-          <a:xfrm>
-            <a:off x="710208" y="4005064"/>
-            <a:ext cx="7911008" cy="2650165"/>
+            <a:off x="1209205" y="1780945"/>
+            <a:ext cx="6725589" cy="3296110"/>
           </a:xfrm>
           <a:prstGeom prst="rect">
             <a:avLst/>
@@ -4911,7 +4914,7 @@
     </p:spTree>
     <p:extLst>
       <p:ext uri="{BB962C8B-B14F-4D97-AF65-F5344CB8AC3E}">
-        <p14:creationId xmlns:p14="http://schemas.microsoft.com/office/powerpoint/2010/main" val="513079372"/>
+        <p14:creationId xmlns:p14="http://schemas.microsoft.com/office/powerpoint/2010/main" val="2891682036"/>
       </p:ext>
     </p:extLst>
   </p:cSld>
@@ -4947,32 +4950,45 @@
       </p:grpSpPr>
       <p:sp>
         <p:nvSpPr>
-          <p:cNvPr id="2" name="標題 1"/>
-          <p:cNvSpPr>
-            <a:spLocks noGrp="1"/>
-          </p:cNvSpPr>
-          <p:nvPr>
-            <p:ph type="title"/>
-          </p:nvPr>
-        </p:nvSpPr>
-        <p:spPr/>
-        <p:txBody>
-          <a:bodyPr>
-            <a:normAutofit fontScale="90000"/>
+          <p:cNvPr id="4" name="標題 1"/>
+          <p:cNvSpPr txBox="1">
+            <a:spLocks/>
+          </p:cNvSpPr>
+          <p:nvPr/>
+        </p:nvSpPr>
+        <p:spPr>
+          <a:xfrm>
+            <a:off x="609600" y="427038"/>
+            <a:ext cx="8229600" cy="1143000"/>
+          </a:xfrm>
+          <a:prstGeom prst="rect">
+            <a:avLst/>
+          </a:prstGeom>
+        </p:spPr>
+        <p:txBody>
+          <a:bodyPr vert="horz" lIns="91440" tIns="45720" rIns="91440" bIns="45720" rtlCol="0" anchor="ctr">
+            <a:normAutofit/>
           </a:bodyPr>
-          <a:lstStyle/>
-          <a:p>
-            <a:r>
-              <a:rPr lang="en-US" altLang="zh-TW" dirty="0" smtClean="0"/>
-              <a:t>Similarity in R,UR,(R-UR)/</a:t>
-            </a:r>
-            <a:r>
-              <a:rPr lang="en-US" altLang="zh-TW" dirty="0" smtClean="0"/>
-              <a:t>2 on </a:t>
-            </a:r>
-            <a:r>
-              <a:rPr lang="en-US" altLang="zh-TW" dirty="0" err="1" smtClean="0"/>
-              <a:t>TrainSet</a:t>
+          <a:lstStyle>
+            <a:lvl1pPr algn="ctr" defTabSz="914400" rtl="0" eaLnBrk="1" latinLnBrk="0" hangingPunct="1">
+              <a:spcBef>
+                <a:spcPct val="0"/>
+              </a:spcBef>
+              <a:buNone/>
+              <a:defRPr sz="4400" kern="1200">
+                <a:solidFill>
+                  <a:schemeClr val="tx1"/>
+                </a:solidFill>
+                <a:latin typeface="+mj-lt"/>
+                <a:ea typeface="+mj-ea"/>
+                <a:cs typeface="+mj-cs"/>
+              </a:defRPr>
+            </a:lvl1pPr>
+          </a:lstStyle>
+          <a:p>
+            <a:r>
+              <a:rPr lang="en-US" altLang="zh-TW" smtClean="0"/>
+              <a:t>Reconstruction loss</a:t>
             </a:r>
             <a:endParaRPr lang="zh-TW" altLang="en-US" dirty="0"/>
           </a:p>
@@ -4980,7 +4996,7 @@
       </p:sp>
       <p:pic>
         <p:nvPicPr>
-          <p:cNvPr id="6" name="圖片 5" descr="畫面剪輯"/>
+          <p:cNvPr id="8" name="圖片 7" descr="畫面剪輯"/>
           <p:cNvPicPr>
             <a:picLocks noChangeAspect="1"/>
           </p:cNvPicPr>
@@ -5000,52 +5016,17 @@
         </p:blipFill>
         <p:spPr>
           <a:xfrm>
-            <a:off x="1475656" y="1805440"/>
-            <a:ext cx="2592288" cy="2160240"/>
+            <a:off x="710208" y="1340768"/>
+            <a:ext cx="8028384" cy="2676128"/>
           </a:xfrm>
           <a:prstGeom prst="rect">
             <a:avLst/>
           </a:prstGeom>
-          <a:ln>
-            <a:solidFill>
-              <a:srgbClr val="FF0000"/>
-            </a:solidFill>
-          </a:ln>
         </p:spPr>
       </p:pic>
-      <p:sp>
-        <p:nvSpPr>
-          <p:cNvPr id="7" name="文字方塊 6"/>
-          <p:cNvSpPr txBox="1"/>
-          <p:nvPr/>
-        </p:nvSpPr>
-        <p:spPr>
-          <a:xfrm>
-            <a:off x="2386709" y="1395024"/>
-            <a:ext cx="664669" cy="369332"/>
-          </a:xfrm>
-          <a:prstGeom prst="rect">
-            <a:avLst/>
-          </a:prstGeom>
-          <a:noFill/>
-        </p:spPr>
-        <p:txBody>
-          <a:bodyPr wrap="none" rtlCol="0">
-            <a:spAutoFit/>
-          </a:bodyPr>
-          <a:lstStyle/>
-          <a:p>
-            <a:r>
-              <a:rPr lang="en-US" altLang="zh-TW" dirty="0" smtClean="0"/>
-              <a:t>BOW</a:t>
-            </a:r>
-            <a:endParaRPr lang="zh-TW" altLang="en-US" dirty="0"/>
-          </a:p>
-        </p:txBody>
-      </p:sp>
       <p:pic>
         <p:nvPicPr>
-          <p:cNvPr id="10" name="圖片 9" descr="畫面剪輯"/>
+          <p:cNvPr id="9" name="圖片 8" descr="畫面剪輯"/>
           <p:cNvPicPr>
             <a:picLocks noChangeAspect="1"/>
           </p:cNvPicPr>
@@ -5065,237 +5046,18 @@
         </p:blipFill>
         <p:spPr>
           <a:xfrm>
-            <a:off x="4832692" y="1769436"/>
-            <a:ext cx="2363103" cy="2232248"/>
+            <a:off x="710208" y="4005064"/>
+            <a:ext cx="7911008" cy="2650165"/>
           </a:xfrm>
           <a:prstGeom prst="rect">
             <a:avLst/>
           </a:prstGeom>
-          <a:ln>
-            <a:solidFill>
-              <a:srgbClr val="FF0000"/>
-            </a:solidFill>
-          </a:ln>
         </p:spPr>
       </p:pic>
-      <p:sp>
-        <p:nvSpPr>
-          <p:cNvPr id="11" name="文字方塊 10"/>
-          <p:cNvSpPr txBox="1"/>
-          <p:nvPr/>
-        </p:nvSpPr>
-        <p:spPr>
-          <a:xfrm>
-            <a:off x="5289237" y="1268760"/>
-            <a:ext cx="1450012" cy="369332"/>
-          </a:xfrm>
-          <a:prstGeom prst="rect">
-            <a:avLst/>
-          </a:prstGeom>
-          <a:noFill/>
-        </p:spPr>
-        <p:txBody>
-          <a:bodyPr wrap="none" rtlCol="0">
-            <a:spAutoFit/>
-          </a:bodyPr>
-          <a:lstStyle/>
-          <a:p>
-            <a:r>
-              <a:rPr lang="en-US" altLang="zh-TW" dirty="0" smtClean="0"/>
-              <a:t>AE in </a:t>
-            </a:r>
-            <a:r>
-              <a:rPr lang="en-US" altLang="zh-TW" dirty="0" err="1" smtClean="0"/>
-              <a:t>Trainset</a:t>
-            </a:r>
-            <a:endParaRPr lang="zh-TW" altLang="en-US" dirty="0"/>
-          </a:p>
-        </p:txBody>
-      </p:sp>
-      <p:pic>
-        <p:nvPicPr>
-          <p:cNvPr id="3" name="圖片 2" descr="畫面剪輯"/>
-          <p:cNvPicPr>
-            <a:picLocks noChangeAspect="1"/>
-          </p:cNvPicPr>
-          <p:nvPr/>
-        </p:nvPicPr>
-        <p:blipFill>
-          <a:blip r:embed="rId4">
-            <a:extLst>
-              <a:ext uri="{28A0092B-C50C-407E-A947-70E740481C1C}">
-                <a14:useLocalDpi xmlns:a14="http://schemas.microsoft.com/office/drawing/2010/main" val="0"/>
-              </a:ext>
-            </a:extLst>
-          </a:blip>
-          <a:stretch>
-            <a:fillRect/>
-          </a:stretch>
-        </p:blipFill>
-        <p:spPr>
-          <a:xfrm>
-            <a:off x="4716016" y="4923776"/>
-            <a:ext cx="2943636" cy="1543265"/>
-          </a:xfrm>
-          <a:prstGeom prst="rect">
-            <a:avLst/>
-          </a:prstGeom>
-          <a:ln>
-            <a:solidFill>
-              <a:srgbClr val="FF0000"/>
-            </a:solidFill>
-          </a:ln>
-        </p:spPr>
-      </p:pic>
-      <p:sp>
-        <p:nvSpPr>
-          <p:cNvPr id="13" name="文字方塊 12"/>
-          <p:cNvSpPr txBox="1"/>
-          <p:nvPr/>
-        </p:nvSpPr>
-        <p:spPr>
-          <a:xfrm>
-            <a:off x="5842396" y="4553580"/>
-            <a:ext cx="889731" cy="369332"/>
-          </a:xfrm>
-          <a:prstGeom prst="rect">
-            <a:avLst/>
-          </a:prstGeom>
-          <a:noFill/>
-        </p:spPr>
-        <p:txBody>
-          <a:bodyPr wrap="none" rtlCol="0">
-            <a:spAutoFit/>
-          </a:bodyPr>
-          <a:lstStyle/>
-          <a:p>
-            <a:r>
-              <a:rPr lang="en-US" altLang="zh-TW" dirty="0" smtClean="0"/>
-              <a:t>Test </a:t>
-            </a:r>
-            <a:r>
-              <a:rPr lang="en-US" altLang="zh-TW" dirty="0" smtClean="0"/>
-              <a:t>set</a:t>
-            </a:r>
-            <a:endParaRPr lang="zh-TW" altLang="en-US" dirty="0"/>
-          </a:p>
-        </p:txBody>
-      </p:sp>
-      <p:sp>
-        <p:nvSpPr>
-          <p:cNvPr id="15" name="文字方塊 14"/>
-          <p:cNvSpPr txBox="1"/>
-          <p:nvPr/>
-        </p:nvSpPr>
-        <p:spPr>
-          <a:xfrm>
-            <a:off x="3203848" y="4234853"/>
-            <a:ext cx="2584875" cy="369332"/>
-          </a:xfrm>
-          <a:prstGeom prst="rect">
-            <a:avLst/>
-          </a:prstGeom>
-          <a:noFill/>
-        </p:spPr>
-        <p:txBody>
-          <a:bodyPr wrap="none" rtlCol="0">
-            <a:spAutoFit/>
-          </a:bodyPr>
-          <a:lstStyle/>
-          <a:p>
-            <a:r>
-              <a:rPr lang="en-US" altLang="zh-TW" dirty="0" smtClean="0"/>
-              <a:t>Supervised </a:t>
-            </a:r>
-            <a:r>
-              <a:rPr lang="en-US" altLang="zh-TW" dirty="0" err="1" smtClean="0"/>
-              <a:t>Denosising</a:t>
-            </a:r>
-            <a:r>
-              <a:rPr lang="en-US" altLang="zh-TW" dirty="0" smtClean="0"/>
-              <a:t> </a:t>
-            </a:r>
-            <a:r>
-              <a:rPr lang="en-US" altLang="zh-TW" dirty="0" smtClean="0"/>
-              <a:t>AE</a:t>
-            </a:r>
-            <a:endParaRPr lang="zh-TW" altLang="en-US" dirty="0"/>
-          </a:p>
-        </p:txBody>
-      </p:sp>
-      <p:pic>
-        <p:nvPicPr>
-          <p:cNvPr id="4" name="圖片 3" descr="畫面剪輯"/>
-          <p:cNvPicPr>
-            <a:picLocks noChangeAspect="1"/>
-          </p:cNvPicPr>
-          <p:nvPr/>
-        </p:nvPicPr>
-        <p:blipFill>
-          <a:blip r:embed="rId5">
-            <a:extLst>
-              <a:ext uri="{28A0092B-C50C-407E-A947-70E740481C1C}">
-                <a14:useLocalDpi xmlns:a14="http://schemas.microsoft.com/office/drawing/2010/main" val="0"/>
-              </a:ext>
-            </a:extLst>
-          </a:blip>
-          <a:stretch>
-            <a:fillRect/>
-          </a:stretch>
-        </p:blipFill>
-        <p:spPr>
-          <a:xfrm>
-            <a:off x="1069233" y="4933329"/>
-            <a:ext cx="2953162" cy="1533739"/>
-          </a:xfrm>
-          <a:prstGeom prst="rect">
-            <a:avLst/>
-          </a:prstGeom>
-          <a:ln>
-            <a:solidFill>
-              <a:srgbClr val="FF0000"/>
-            </a:solidFill>
-          </a:ln>
-        </p:spPr>
-      </p:pic>
-      <p:sp>
-        <p:nvSpPr>
-          <p:cNvPr id="16" name="文字方塊 15"/>
-          <p:cNvSpPr txBox="1"/>
-          <p:nvPr/>
-        </p:nvSpPr>
-        <p:spPr>
-          <a:xfrm>
-            <a:off x="2270931" y="4521314"/>
-            <a:ext cx="889731" cy="369332"/>
-          </a:xfrm>
-          <a:prstGeom prst="rect">
-            <a:avLst/>
-          </a:prstGeom>
-          <a:noFill/>
-        </p:spPr>
-        <p:txBody>
-          <a:bodyPr wrap="none" rtlCol="0">
-            <a:spAutoFit/>
-          </a:bodyPr>
-          <a:lstStyle/>
-          <a:p>
-            <a:r>
-              <a:rPr lang="en-US" altLang="zh-TW" dirty="0" smtClean="0"/>
-              <a:t>Test </a:t>
-            </a:r>
-            <a:r>
-              <a:rPr lang="en-US" altLang="zh-TW" dirty="0" smtClean="0"/>
-              <a:t>set</a:t>
-            </a:r>
-            <a:endParaRPr lang="zh-TW" altLang="en-US" dirty="0"/>
-          </a:p>
-        </p:txBody>
-      </p:sp>
     </p:spTree>
     <p:extLst>
       <p:ext uri="{BB962C8B-B14F-4D97-AF65-F5344CB8AC3E}">
-        <p14:creationId xmlns:p14="http://schemas.microsoft.com/office/powerpoint/2010/main" val="4101299992"/>
+        <p14:creationId xmlns:p14="http://schemas.microsoft.com/office/powerpoint/2010/main" val="513079372"/>
       </p:ext>
     </p:extLst>
   </p:cSld>
@@ -5341,6 +5103,374 @@
         </p:nvSpPr>
         <p:spPr/>
         <p:txBody>
+          <a:bodyPr>
+            <a:normAutofit fontScale="90000"/>
+          </a:bodyPr>
+          <a:lstStyle/>
+          <a:p>
+            <a:r>
+              <a:rPr lang="en-US" altLang="zh-TW" dirty="0" smtClean="0"/>
+              <a:t>Similarity in R,UR,(R-UR)/2 on </a:t>
+            </a:r>
+            <a:r>
+              <a:rPr lang="en-US" altLang="zh-TW" dirty="0" err="1" smtClean="0"/>
+              <a:t>TrainSet</a:t>
+            </a:r>
+            <a:endParaRPr lang="zh-TW" altLang="en-US" dirty="0"/>
+          </a:p>
+        </p:txBody>
+      </p:sp>
+      <p:pic>
+        <p:nvPicPr>
+          <p:cNvPr id="6" name="圖片 5" descr="畫面剪輯"/>
+          <p:cNvPicPr>
+            <a:picLocks noChangeAspect="1"/>
+          </p:cNvPicPr>
+          <p:nvPr/>
+        </p:nvPicPr>
+        <p:blipFill>
+          <a:blip r:embed="rId2">
+            <a:extLst>
+              <a:ext uri="{28A0092B-C50C-407E-A947-70E740481C1C}">
+                <a14:useLocalDpi xmlns:a14="http://schemas.microsoft.com/office/drawing/2010/main" val="0"/>
+              </a:ext>
+            </a:extLst>
+          </a:blip>
+          <a:stretch>
+            <a:fillRect/>
+          </a:stretch>
+        </p:blipFill>
+        <p:spPr>
+          <a:xfrm>
+            <a:off x="1475656" y="1805440"/>
+            <a:ext cx="2592288" cy="2160240"/>
+          </a:xfrm>
+          <a:prstGeom prst="rect">
+            <a:avLst/>
+          </a:prstGeom>
+          <a:ln>
+            <a:solidFill>
+              <a:srgbClr val="FF0000"/>
+            </a:solidFill>
+          </a:ln>
+        </p:spPr>
+      </p:pic>
+      <p:sp>
+        <p:nvSpPr>
+          <p:cNvPr id="7" name="文字方塊 6"/>
+          <p:cNvSpPr txBox="1"/>
+          <p:nvPr/>
+        </p:nvSpPr>
+        <p:spPr>
+          <a:xfrm>
+            <a:off x="2386709" y="1395024"/>
+            <a:ext cx="664669" cy="369332"/>
+          </a:xfrm>
+          <a:prstGeom prst="rect">
+            <a:avLst/>
+          </a:prstGeom>
+          <a:noFill/>
+        </p:spPr>
+        <p:txBody>
+          <a:bodyPr wrap="none" rtlCol="0">
+            <a:spAutoFit/>
+          </a:bodyPr>
+          <a:lstStyle/>
+          <a:p>
+            <a:r>
+              <a:rPr lang="en-US" altLang="zh-TW" dirty="0" smtClean="0"/>
+              <a:t>BOW</a:t>
+            </a:r>
+            <a:endParaRPr lang="zh-TW" altLang="en-US" dirty="0"/>
+          </a:p>
+        </p:txBody>
+      </p:sp>
+      <p:pic>
+        <p:nvPicPr>
+          <p:cNvPr id="10" name="圖片 9" descr="畫面剪輯"/>
+          <p:cNvPicPr>
+            <a:picLocks noChangeAspect="1"/>
+          </p:cNvPicPr>
+          <p:nvPr/>
+        </p:nvPicPr>
+        <p:blipFill>
+          <a:blip r:embed="rId3">
+            <a:extLst>
+              <a:ext uri="{28A0092B-C50C-407E-A947-70E740481C1C}">
+                <a14:useLocalDpi xmlns:a14="http://schemas.microsoft.com/office/drawing/2010/main" val="0"/>
+              </a:ext>
+            </a:extLst>
+          </a:blip>
+          <a:stretch>
+            <a:fillRect/>
+          </a:stretch>
+        </p:blipFill>
+        <p:spPr>
+          <a:xfrm>
+            <a:off x="4832692" y="1769436"/>
+            <a:ext cx="2363103" cy="2232248"/>
+          </a:xfrm>
+          <a:prstGeom prst="rect">
+            <a:avLst/>
+          </a:prstGeom>
+          <a:ln>
+            <a:solidFill>
+              <a:srgbClr val="FF0000"/>
+            </a:solidFill>
+          </a:ln>
+        </p:spPr>
+      </p:pic>
+      <p:sp>
+        <p:nvSpPr>
+          <p:cNvPr id="11" name="文字方塊 10"/>
+          <p:cNvSpPr txBox="1"/>
+          <p:nvPr/>
+        </p:nvSpPr>
+        <p:spPr>
+          <a:xfrm>
+            <a:off x="5289237" y="1268760"/>
+            <a:ext cx="1450012" cy="369332"/>
+          </a:xfrm>
+          <a:prstGeom prst="rect">
+            <a:avLst/>
+          </a:prstGeom>
+          <a:noFill/>
+        </p:spPr>
+        <p:txBody>
+          <a:bodyPr wrap="none" rtlCol="0">
+            <a:spAutoFit/>
+          </a:bodyPr>
+          <a:lstStyle/>
+          <a:p>
+            <a:r>
+              <a:rPr lang="en-US" altLang="zh-TW" dirty="0" smtClean="0"/>
+              <a:t>AE in </a:t>
+            </a:r>
+            <a:r>
+              <a:rPr lang="en-US" altLang="zh-TW" dirty="0" err="1" smtClean="0"/>
+              <a:t>Trainset</a:t>
+            </a:r>
+            <a:endParaRPr lang="zh-TW" altLang="en-US" dirty="0"/>
+          </a:p>
+        </p:txBody>
+      </p:sp>
+      <p:pic>
+        <p:nvPicPr>
+          <p:cNvPr id="3" name="圖片 2" descr="畫面剪輯"/>
+          <p:cNvPicPr>
+            <a:picLocks noChangeAspect="1"/>
+          </p:cNvPicPr>
+          <p:nvPr/>
+        </p:nvPicPr>
+        <p:blipFill>
+          <a:blip r:embed="rId4">
+            <a:extLst>
+              <a:ext uri="{28A0092B-C50C-407E-A947-70E740481C1C}">
+                <a14:useLocalDpi xmlns:a14="http://schemas.microsoft.com/office/drawing/2010/main" val="0"/>
+              </a:ext>
+            </a:extLst>
+          </a:blip>
+          <a:stretch>
+            <a:fillRect/>
+          </a:stretch>
+        </p:blipFill>
+        <p:spPr>
+          <a:xfrm>
+            <a:off x="4716016" y="4923776"/>
+            <a:ext cx="2943636" cy="1543265"/>
+          </a:xfrm>
+          <a:prstGeom prst="rect">
+            <a:avLst/>
+          </a:prstGeom>
+          <a:ln>
+            <a:solidFill>
+              <a:srgbClr val="FF0000"/>
+            </a:solidFill>
+          </a:ln>
+        </p:spPr>
+      </p:pic>
+      <p:sp>
+        <p:nvSpPr>
+          <p:cNvPr id="13" name="文字方塊 12"/>
+          <p:cNvSpPr txBox="1"/>
+          <p:nvPr/>
+        </p:nvSpPr>
+        <p:spPr>
+          <a:xfrm>
+            <a:off x="5842396" y="4553580"/>
+            <a:ext cx="889731" cy="369332"/>
+          </a:xfrm>
+          <a:prstGeom prst="rect">
+            <a:avLst/>
+          </a:prstGeom>
+          <a:noFill/>
+        </p:spPr>
+        <p:txBody>
+          <a:bodyPr wrap="none" rtlCol="0">
+            <a:spAutoFit/>
+          </a:bodyPr>
+          <a:lstStyle/>
+          <a:p>
+            <a:r>
+              <a:rPr lang="en-US" altLang="zh-TW" dirty="0" smtClean="0"/>
+              <a:t>Test set</a:t>
+            </a:r>
+            <a:endParaRPr lang="zh-TW" altLang="en-US" dirty="0"/>
+          </a:p>
+        </p:txBody>
+      </p:sp>
+      <p:sp>
+        <p:nvSpPr>
+          <p:cNvPr id="15" name="文字方塊 14"/>
+          <p:cNvSpPr txBox="1"/>
+          <p:nvPr/>
+        </p:nvSpPr>
+        <p:spPr>
+          <a:xfrm>
+            <a:off x="3203848" y="4234853"/>
+            <a:ext cx="2584875" cy="369332"/>
+          </a:xfrm>
+          <a:prstGeom prst="rect">
+            <a:avLst/>
+          </a:prstGeom>
+          <a:noFill/>
+        </p:spPr>
+        <p:txBody>
+          <a:bodyPr wrap="none" rtlCol="0">
+            <a:spAutoFit/>
+          </a:bodyPr>
+          <a:lstStyle/>
+          <a:p>
+            <a:r>
+              <a:rPr lang="en-US" altLang="zh-TW" dirty="0" smtClean="0"/>
+              <a:t>Supervised </a:t>
+            </a:r>
+            <a:r>
+              <a:rPr lang="en-US" altLang="zh-TW" dirty="0" err="1" smtClean="0"/>
+              <a:t>Denosising</a:t>
+            </a:r>
+            <a:r>
+              <a:rPr lang="en-US" altLang="zh-TW" dirty="0" smtClean="0"/>
+              <a:t> AE</a:t>
+            </a:r>
+            <a:endParaRPr lang="zh-TW" altLang="en-US" dirty="0"/>
+          </a:p>
+        </p:txBody>
+      </p:sp>
+      <p:pic>
+        <p:nvPicPr>
+          <p:cNvPr id="4" name="圖片 3" descr="畫面剪輯"/>
+          <p:cNvPicPr>
+            <a:picLocks noChangeAspect="1"/>
+          </p:cNvPicPr>
+          <p:nvPr/>
+        </p:nvPicPr>
+        <p:blipFill>
+          <a:blip r:embed="rId5">
+            <a:extLst>
+              <a:ext uri="{28A0092B-C50C-407E-A947-70E740481C1C}">
+                <a14:useLocalDpi xmlns:a14="http://schemas.microsoft.com/office/drawing/2010/main" val="0"/>
+              </a:ext>
+            </a:extLst>
+          </a:blip>
+          <a:stretch>
+            <a:fillRect/>
+          </a:stretch>
+        </p:blipFill>
+        <p:spPr>
+          <a:xfrm>
+            <a:off x="1069233" y="4933329"/>
+            <a:ext cx="2953162" cy="1533739"/>
+          </a:xfrm>
+          <a:prstGeom prst="rect">
+            <a:avLst/>
+          </a:prstGeom>
+          <a:ln>
+            <a:solidFill>
+              <a:srgbClr val="FF0000"/>
+            </a:solidFill>
+          </a:ln>
+        </p:spPr>
+      </p:pic>
+      <p:sp>
+        <p:nvSpPr>
+          <p:cNvPr id="16" name="文字方塊 15"/>
+          <p:cNvSpPr txBox="1"/>
+          <p:nvPr/>
+        </p:nvSpPr>
+        <p:spPr>
+          <a:xfrm>
+            <a:off x="2270931" y="4521314"/>
+            <a:ext cx="889731" cy="369332"/>
+          </a:xfrm>
+          <a:prstGeom prst="rect">
+            <a:avLst/>
+          </a:prstGeom>
+          <a:noFill/>
+        </p:spPr>
+        <p:txBody>
+          <a:bodyPr wrap="none" rtlCol="0">
+            <a:spAutoFit/>
+          </a:bodyPr>
+          <a:lstStyle/>
+          <a:p>
+            <a:r>
+              <a:rPr lang="en-US" altLang="zh-TW" dirty="0" smtClean="0"/>
+              <a:t>Test set</a:t>
+            </a:r>
+            <a:endParaRPr lang="zh-TW" altLang="en-US" dirty="0"/>
+          </a:p>
+        </p:txBody>
+      </p:sp>
+    </p:spTree>
+    <p:extLst>
+      <p:ext uri="{BB962C8B-B14F-4D97-AF65-F5344CB8AC3E}">
+        <p14:creationId xmlns:p14="http://schemas.microsoft.com/office/powerpoint/2010/main" val="4101299992"/>
+      </p:ext>
+    </p:extLst>
+  </p:cSld>
+  <p:clrMapOvr>
+    <a:masterClrMapping/>
+  </p:clrMapOvr>
+  <p:timing>
+    <p:tnLst>
+      <p:par>
+        <p:cTn id="1" dur="indefinite" restart="never" nodeType="tmRoot"/>
+      </p:par>
+    </p:tnLst>
+  </p:timing>
+</p:sld>
+</file>
+
+<file path=ppt/slides/slide27.xml><?xml version="1.0" encoding="utf-8"?>
+<p:sld xmlns:a="http://schemas.openxmlformats.org/drawingml/2006/main" xmlns:r="http://schemas.openxmlformats.org/officeDocument/2006/relationships" xmlns:p="http://schemas.openxmlformats.org/presentationml/2006/main">
+  <p:cSld>
+    <p:spTree>
+      <p:nvGrpSpPr>
+        <p:cNvPr id="1" name=""/>
+        <p:cNvGrpSpPr/>
+        <p:nvPr/>
+      </p:nvGrpSpPr>
+      <p:grpSpPr>
+        <a:xfrm>
+          <a:off x="0" y="0"/>
+          <a:ext cx="0" cy="0"/>
+          <a:chOff x="0" y="0"/>
+          <a:chExt cx="0" cy="0"/>
+        </a:xfrm>
+      </p:grpSpPr>
+      <p:sp>
+        <p:nvSpPr>
+          <p:cNvPr id="2" name="標題 1"/>
+          <p:cNvSpPr>
+            <a:spLocks noGrp="1"/>
+          </p:cNvSpPr>
+          <p:nvPr>
+            <p:ph type="title"/>
+          </p:nvPr>
+        </p:nvSpPr>
+        <p:spPr/>
+        <p:txBody>
           <a:bodyPr/>
           <a:lstStyle/>
           <a:p>
@@ -5399,7 +5529,7 @@
 </p:sld>
 </file>
 
-<file path=ppt/slides/slide27.xml><?xml version="1.0" encoding="utf-8"?>
+<file path=ppt/slides/slide28.xml><?xml version="1.0" encoding="utf-8"?>
 <p:sld xmlns:a="http://schemas.openxmlformats.org/drawingml/2006/main" xmlns:r="http://schemas.openxmlformats.org/officeDocument/2006/relationships" xmlns:p="http://schemas.openxmlformats.org/presentationml/2006/main">
   <p:cSld>
     <p:spTree>
@@ -5585,6 +5715,96 @@
 </file>
 
 <file path=ppt/slides/slide3.xml><?xml version="1.0" encoding="utf-8"?>
+<p:sld xmlns:a="http://schemas.openxmlformats.org/drawingml/2006/main" xmlns:r="http://schemas.openxmlformats.org/officeDocument/2006/relationships" xmlns:p="http://schemas.openxmlformats.org/presentationml/2006/main">
+  <p:cSld>
+    <p:spTree>
+      <p:nvGrpSpPr>
+        <p:cNvPr id="1" name=""/>
+        <p:cNvGrpSpPr/>
+        <p:nvPr/>
+      </p:nvGrpSpPr>
+      <p:grpSpPr>
+        <a:xfrm>
+          <a:off x="0" y="0"/>
+          <a:ext cx="0" cy="0"/>
+          <a:chOff x="0" y="0"/>
+          <a:chExt cx="0" cy="0"/>
+        </a:xfrm>
+      </p:grpSpPr>
+      <p:sp>
+        <p:nvSpPr>
+          <p:cNvPr id="2" name="標題 1"/>
+          <p:cNvSpPr>
+            <a:spLocks noGrp="1"/>
+          </p:cNvSpPr>
+          <p:nvPr>
+            <p:ph type="title"/>
+          </p:nvPr>
+        </p:nvSpPr>
+        <p:spPr/>
+        <p:txBody>
+          <a:bodyPr/>
+          <a:lstStyle/>
+          <a:p>
+            <a:r>
+              <a:rPr lang="en-US" altLang="zh-TW" dirty="0" smtClean="0"/>
+              <a:t>VIP</a:t>
+            </a:r>
+            <a:r>
+              <a:rPr lang="zh-TW" altLang="en-US" dirty="0" smtClean="0"/>
+              <a:t> </a:t>
+            </a:r>
+            <a:r>
+              <a:rPr lang="en-US" altLang="zh-TW" dirty="0" smtClean="0"/>
+              <a:t>with only one industry</a:t>
+            </a:r>
+            <a:endParaRPr lang="zh-TW" altLang="en-US" dirty="0"/>
+          </a:p>
+        </p:txBody>
+      </p:sp>
+      <p:pic>
+        <p:nvPicPr>
+          <p:cNvPr id="4" name="內容版面配置區 3" descr="畫面剪輯"/>
+          <p:cNvPicPr>
+            <a:picLocks noGrp="1" noChangeAspect="1"/>
+          </p:cNvPicPr>
+          <p:nvPr>
+            <p:ph idx="1"/>
+          </p:nvPr>
+        </p:nvPicPr>
+        <p:blipFill>
+          <a:blip r:embed="rId2">
+            <a:extLst>
+              <a:ext uri="{28A0092B-C50C-407E-A947-70E740481C1C}">
+                <a14:useLocalDpi xmlns:a14="http://schemas.microsoft.com/office/drawing/2010/main" val="0"/>
+              </a:ext>
+            </a:extLst>
+          </a:blip>
+          <a:stretch>
+            <a:fillRect/>
+          </a:stretch>
+        </p:blipFill>
+        <p:spPr>
+          <a:xfrm>
+            <a:off x="1847469" y="2386600"/>
+            <a:ext cx="5449061" cy="2953162"/>
+          </a:xfrm>
+        </p:spPr>
+      </p:pic>
+    </p:spTree>
+    <p:extLst>
+      <p:ext uri="{BB962C8B-B14F-4D97-AF65-F5344CB8AC3E}">
+        <p14:creationId xmlns:p14="http://schemas.microsoft.com/office/powerpoint/2010/main" val="2531281622"/>
+      </p:ext>
+    </p:extLst>
+  </p:cSld>
+  <p:clrMapOvr>
+    <a:masterClrMapping/>
+  </p:clrMapOvr>
+</p:sld>
+</file>
+
+<file path=ppt/slides/slide4.xml><?xml version="1.0" encoding="utf-8"?>
 <p:sld xmlns:a="http://schemas.openxmlformats.org/drawingml/2006/main" xmlns:r="http://schemas.openxmlformats.org/officeDocument/2006/relationships" xmlns:p="http://schemas.openxmlformats.org/presentationml/2006/main">
   <p:cSld>
     <p:spTree>
@@ -5666,6 +5886,221 @@
           </a:p>
         </p:txBody>
       </p:sp>
+      <p:pic>
+        <p:nvPicPr>
+          <p:cNvPr id="3" name="圖片 2" descr="畫面剪輯"/>
+          <p:cNvPicPr>
+            <a:picLocks noChangeAspect="1"/>
+          </p:cNvPicPr>
+          <p:nvPr/>
+        </p:nvPicPr>
+        <p:blipFill>
+          <a:blip r:embed="rId3">
+            <a:extLst>
+              <a:ext uri="{28A0092B-C50C-407E-A947-70E740481C1C}">
+                <a14:useLocalDpi xmlns:a14="http://schemas.microsoft.com/office/drawing/2010/main" val="0"/>
+              </a:ext>
+            </a:extLst>
+          </a:blip>
+          <a:stretch>
+            <a:fillRect/>
+          </a:stretch>
+        </p:blipFill>
+        <p:spPr>
+          <a:xfrm>
+            <a:off x="3794052" y="1203581"/>
+            <a:ext cx="1581371" cy="4544060"/>
+          </a:xfrm>
+          <a:prstGeom prst="rect">
+            <a:avLst/>
+          </a:prstGeom>
+        </p:spPr>
+      </p:pic>
+      <p:sp>
+        <p:nvSpPr>
+          <p:cNvPr id="5" name="文字方塊 4"/>
+          <p:cNvSpPr txBox="1"/>
+          <p:nvPr/>
+        </p:nvSpPr>
+        <p:spPr>
+          <a:xfrm>
+            <a:off x="3823693" y="609222"/>
+            <a:ext cx="1338828" cy="369332"/>
+          </a:xfrm>
+          <a:prstGeom prst="rect">
+            <a:avLst/>
+          </a:prstGeom>
+          <a:noFill/>
+          <a:ln>
+            <a:solidFill>
+              <a:schemeClr val="accent1"/>
+            </a:solidFill>
+          </a:ln>
+        </p:spPr>
+        <p:txBody>
+          <a:bodyPr wrap="none" rtlCol="0">
+            <a:spAutoFit/>
+          </a:bodyPr>
+          <a:lstStyle/>
+          <a:p>
+            <a:r>
+              <a:rPr lang="zh-TW" altLang="en-US" dirty="0" smtClean="0"/>
+              <a:t>隨機</a:t>
+            </a:r>
+            <a:r>
+              <a:rPr lang="zh-TW" altLang="en-US" dirty="0"/>
+              <a:t>五</a:t>
+            </a:r>
+            <a:r>
+              <a:rPr lang="zh-TW" altLang="en-US" dirty="0" smtClean="0"/>
+              <a:t>萬</a:t>
+            </a:r>
+            <a:r>
+              <a:rPr lang="zh-TW" altLang="en-US" dirty="0" smtClean="0"/>
+              <a:t>篇</a:t>
+            </a:r>
+            <a:endParaRPr lang="zh-TW" altLang="en-US" dirty="0"/>
+          </a:p>
+        </p:txBody>
+      </p:sp>
+      <p:pic>
+        <p:nvPicPr>
+          <p:cNvPr id="4" name="圖片 3" descr="畫面剪輯"/>
+          <p:cNvPicPr>
+            <a:picLocks noChangeAspect="1"/>
+          </p:cNvPicPr>
+          <p:nvPr/>
+        </p:nvPicPr>
+        <p:blipFill>
+          <a:blip r:embed="rId4">
+            <a:extLst>
+              <a:ext uri="{28A0092B-C50C-407E-A947-70E740481C1C}">
+                <a14:useLocalDpi xmlns:a14="http://schemas.microsoft.com/office/drawing/2010/main" val="0"/>
+              </a:ext>
+            </a:extLst>
+          </a:blip>
+          <a:stretch>
+            <a:fillRect/>
+          </a:stretch>
+        </p:blipFill>
+        <p:spPr>
+          <a:xfrm>
+            <a:off x="5652120" y="1226488"/>
+            <a:ext cx="1571844" cy="4239217"/>
+          </a:xfrm>
+          <a:prstGeom prst="rect">
+            <a:avLst/>
+          </a:prstGeom>
+        </p:spPr>
+      </p:pic>
+      <p:sp>
+        <p:nvSpPr>
+          <p:cNvPr id="7" name="文字方塊 6"/>
+          <p:cNvSpPr txBox="1"/>
+          <p:nvPr/>
+        </p:nvSpPr>
+        <p:spPr>
+          <a:xfrm>
+            <a:off x="5940152" y="609222"/>
+            <a:ext cx="1389098" cy="369332"/>
+          </a:xfrm>
+          <a:prstGeom prst="rect">
+            <a:avLst/>
+          </a:prstGeom>
+          <a:noFill/>
+          <a:ln>
+            <a:solidFill>
+              <a:schemeClr val="accent1"/>
+            </a:solidFill>
+          </a:ln>
+        </p:spPr>
+        <p:txBody>
+          <a:bodyPr wrap="none" rtlCol="0">
+            <a:spAutoFit/>
+          </a:bodyPr>
+          <a:lstStyle/>
+          <a:p>
+            <a:r>
+              <a:rPr lang="en-US" altLang="zh-TW" dirty="0" err="1" smtClean="0"/>
+              <a:t>Trainset</a:t>
+            </a:r>
+            <a:r>
+              <a:rPr lang="en-US" altLang="zh-TW" dirty="0" smtClean="0"/>
+              <a:t>(3/4)</a:t>
+            </a:r>
+            <a:endParaRPr lang="zh-TW" altLang="en-US" dirty="0"/>
+          </a:p>
+        </p:txBody>
+      </p:sp>
+      <p:pic>
+        <p:nvPicPr>
+          <p:cNvPr id="8" name="圖片 7" descr="畫面剪輯"/>
+          <p:cNvPicPr>
+            <a:picLocks noChangeAspect="1"/>
+          </p:cNvPicPr>
+          <p:nvPr/>
+        </p:nvPicPr>
+        <p:blipFill>
+          <a:blip r:embed="rId5">
+            <a:extLst>
+              <a:ext uri="{28A0092B-C50C-407E-A947-70E740481C1C}">
+                <a14:useLocalDpi xmlns:a14="http://schemas.microsoft.com/office/drawing/2010/main" val="0"/>
+              </a:ext>
+            </a:extLst>
+          </a:blip>
+          <a:stretch>
+            <a:fillRect/>
+          </a:stretch>
+        </p:blipFill>
+        <p:spPr>
+          <a:xfrm>
+            <a:off x="7308304" y="1196752"/>
+            <a:ext cx="1514687" cy="4258270"/>
+          </a:xfrm>
+          <a:prstGeom prst="rect">
+            <a:avLst/>
+          </a:prstGeom>
+        </p:spPr>
+      </p:pic>
+      <p:sp>
+        <p:nvSpPr>
+          <p:cNvPr id="9" name="文字方塊 8"/>
+          <p:cNvSpPr txBox="1"/>
+          <p:nvPr/>
+        </p:nvSpPr>
+        <p:spPr>
+          <a:xfrm>
+            <a:off x="7614016" y="609222"/>
+            <a:ext cx="1301703" cy="369332"/>
+          </a:xfrm>
+          <a:prstGeom prst="rect">
+            <a:avLst/>
+          </a:prstGeom>
+          <a:noFill/>
+          <a:ln>
+            <a:solidFill>
+              <a:schemeClr val="accent1"/>
+            </a:solidFill>
+          </a:ln>
+        </p:spPr>
+        <p:txBody>
+          <a:bodyPr wrap="none" rtlCol="0">
+            <a:spAutoFit/>
+          </a:bodyPr>
+          <a:lstStyle/>
+          <a:p>
+            <a:r>
+              <a:rPr lang="en-US" altLang="zh-TW" dirty="0" err="1" smtClean="0"/>
+              <a:t>Testset</a:t>
+            </a:r>
+            <a:r>
+              <a:rPr lang="en-US" altLang="zh-TW" dirty="0" smtClean="0"/>
+              <a:t>(1/4)</a:t>
+            </a:r>
+            <a:endParaRPr lang="zh-TW" altLang="en-US" dirty="0"/>
+          </a:p>
+        </p:txBody>
+      </p:sp>
     </p:spTree>
     <p:extLst>
       <p:ext uri="{BB962C8B-B14F-4D97-AF65-F5344CB8AC3E}">
@@ -5679,7 +6114,7 @@
 </p:sld>
 </file>
 
-<file path=ppt/slides/slide4.xml><?xml version="1.0" encoding="utf-8"?>
+<file path=ppt/slides/slide5.xml><?xml version="1.0" encoding="utf-8"?>
 <p:sld xmlns:a="http://schemas.openxmlformats.org/drawingml/2006/main" xmlns:r="http://schemas.openxmlformats.org/officeDocument/2006/relationships" xmlns:p="http://schemas.openxmlformats.org/presentationml/2006/main">
   <p:cSld>
     <p:spTree>
@@ -5839,200 +6274,6 @@
     <p:extLst>
       <p:ext uri="{BB962C8B-B14F-4D97-AF65-F5344CB8AC3E}">
         <p14:creationId xmlns:p14="http://schemas.microsoft.com/office/powerpoint/2010/main" val="1461470059"/>
-      </p:ext>
-    </p:extLst>
-  </p:cSld>
-  <p:clrMapOvr>
-    <a:masterClrMapping/>
-  </p:clrMapOvr>
-  <p:timing>
-    <p:tnLst>
-      <p:par>
-        <p:cTn id="1" dur="indefinite" restart="never" nodeType="tmRoot"/>
-      </p:par>
-    </p:tnLst>
-  </p:timing>
-</p:sld>
-</file>
-
-<file path=ppt/slides/slide5.xml><?xml version="1.0" encoding="utf-8"?>
-<p:sld xmlns:a="http://schemas.openxmlformats.org/drawingml/2006/main" xmlns:r="http://schemas.openxmlformats.org/officeDocument/2006/relationships" xmlns:p="http://schemas.openxmlformats.org/presentationml/2006/main">
-  <p:cSld>
-    <p:spTree>
-      <p:nvGrpSpPr>
-        <p:cNvPr id="1" name=""/>
-        <p:cNvGrpSpPr/>
-        <p:nvPr/>
-      </p:nvGrpSpPr>
-      <p:grpSpPr>
-        <a:xfrm>
-          <a:off x="0" y="0"/>
-          <a:ext cx="0" cy="0"/>
-          <a:chOff x="0" y="0"/>
-          <a:chExt cx="0" cy="0"/>
-        </a:xfrm>
-      </p:grpSpPr>
-      <p:sp>
-        <p:nvSpPr>
-          <p:cNvPr id="2" name="標題 1"/>
-          <p:cNvSpPr>
-            <a:spLocks noGrp="1"/>
-          </p:cNvSpPr>
-          <p:nvPr>
-            <p:ph type="title"/>
-          </p:nvPr>
-        </p:nvSpPr>
-        <p:spPr/>
-        <p:txBody>
-          <a:bodyPr>
-            <a:normAutofit fontScale="90000"/>
-          </a:bodyPr>
-          <a:lstStyle/>
-          <a:p>
-            <a:r>
-              <a:rPr lang="en-US" altLang="zh-TW" dirty="0" smtClean="0"/>
-              <a:t>Similarity between 2 industry-</a:t>
-            </a:r>
-            <a:r>
-              <a:rPr lang="en-US" altLang="zh-TW" dirty="0" err="1" smtClean="0"/>
-              <a:t>Bow,unAE,AE</a:t>
-            </a:r>
-            <a:endParaRPr lang="zh-TW" altLang="en-US" dirty="0"/>
-          </a:p>
-        </p:txBody>
-      </p:sp>
-      <p:sp>
-        <p:nvSpPr>
-          <p:cNvPr id="5" name="矩形 4"/>
-          <p:cNvSpPr/>
-          <p:nvPr/>
-        </p:nvSpPr>
-        <p:spPr>
-          <a:xfrm>
-            <a:off x="5004048" y="2042889"/>
-            <a:ext cx="1405193" cy="369332"/>
-          </a:xfrm>
-          <a:prstGeom prst="rect">
-            <a:avLst/>
-          </a:prstGeom>
-        </p:spPr>
-        <p:txBody>
-          <a:bodyPr wrap="none">
-            <a:spAutoFit/>
-          </a:bodyPr>
-          <a:lstStyle/>
-          <a:p>
-            <a:r>
-              <a:rPr lang="en-US" altLang="zh-TW" dirty="0" err="1" smtClean="0"/>
-              <a:t>AutoEncoder</a:t>
-            </a:r>
-            <a:endParaRPr lang="zh-TW" altLang="en-US" dirty="0"/>
-          </a:p>
-        </p:txBody>
-      </p:sp>
-      <p:sp>
-        <p:nvSpPr>
-          <p:cNvPr id="7" name="矩形 6"/>
-          <p:cNvSpPr/>
-          <p:nvPr/>
-        </p:nvSpPr>
-        <p:spPr>
-          <a:xfrm>
-            <a:off x="323527" y="2047270"/>
-            <a:ext cx="595741" cy="369332"/>
-          </a:xfrm>
-          <a:prstGeom prst="rect">
-            <a:avLst/>
-          </a:prstGeom>
-        </p:spPr>
-        <p:txBody>
-          <a:bodyPr wrap="none">
-            <a:spAutoFit/>
-          </a:bodyPr>
-          <a:lstStyle/>
-          <a:p>
-            <a:r>
-              <a:rPr lang="en-US" altLang="zh-TW" dirty="0" smtClean="0"/>
-              <a:t>Bow</a:t>
-            </a:r>
-            <a:endParaRPr lang="zh-TW" altLang="en-US" dirty="0"/>
-          </a:p>
-        </p:txBody>
-      </p:sp>
-      <p:pic>
-        <p:nvPicPr>
-          <p:cNvPr id="9" name="圖片 8" descr="畫面剪輯"/>
-          <p:cNvPicPr>
-            <a:picLocks noChangeAspect="1"/>
-          </p:cNvPicPr>
-          <p:nvPr/>
-        </p:nvPicPr>
-        <p:blipFill>
-          <a:blip r:embed="rId2">
-            <a:extLst>
-              <a:ext uri="{28A0092B-C50C-407E-A947-70E740481C1C}">
-                <a14:useLocalDpi xmlns:a14="http://schemas.microsoft.com/office/drawing/2010/main" val="0"/>
-              </a:ext>
-            </a:extLst>
-          </a:blip>
-          <a:stretch>
-            <a:fillRect/>
-          </a:stretch>
-        </p:blipFill>
-        <p:spPr>
-          <a:xfrm>
-            <a:off x="179512" y="2783172"/>
-            <a:ext cx="4032448" cy="2866439"/>
-          </a:xfrm>
-          <a:prstGeom prst="rect">
-            <a:avLst/>
-          </a:prstGeom>
-          <a:ln>
-            <a:solidFill>
-              <a:srgbClr val="FF0000"/>
-            </a:solidFill>
-          </a:ln>
-        </p:spPr>
-      </p:pic>
-      <p:pic>
-        <p:nvPicPr>
-          <p:cNvPr id="10" name="圖片 9" descr="畫面剪輯"/>
-          <p:cNvPicPr>
-            <a:picLocks noChangeAspect="1"/>
-          </p:cNvPicPr>
-          <p:nvPr/>
-        </p:nvPicPr>
-        <p:blipFill>
-          <a:blip r:embed="rId3">
-            <a:extLst>
-              <a:ext uri="{28A0092B-C50C-407E-A947-70E740481C1C}">
-                <a14:useLocalDpi xmlns:a14="http://schemas.microsoft.com/office/drawing/2010/main" val="0"/>
-              </a:ext>
-            </a:extLst>
-          </a:blip>
-          <a:stretch>
-            <a:fillRect/>
-          </a:stretch>
-        </p:blipFill>
-        <p:spPr>
-          <a:xfrm>
-            <a:off x="4499993" y="2783173"/>
-            <a:ext cx="4032448" cy="2859372"/>
-          </a:xfrm>
-          <a:prstGeom prst="rect">
-            <a:avLst/>
-          </a:prstGeom>
-          <a:ln>
-            <a:solidFill>
-              <a:srgbClr val="FF0000"/>
-            </a:solidFill>
-          </a:ln>
-        </p:spPr>
-      </p:pic>
-    </p:spTree>
-    <p:extLst>
-      <p:ext uri="{BB962C8B-B14F-4D97-AF65-F5344CB8AC3E}">
-        <p14:creationId xmlns:p14="http://schemas.microsoft.com/office/powerpoint/2010/main" val="1014578427"/>
       </p:ext>
     </p:extLst>
   </p:cSld>
@@ -6079,7 +6320,7 @@
         <p:spPr/>
         <p:txBody>
           <a:bodyPr>
-            <a:normAutofit/>
+            <a:normAutofit fontScale="90000"/>
           </a:bodyPr>
           <a:lstStyle/>
           <a:p>
@@ -6089,7 +6330,65 @@
             </a:r>
             <a:r>
               <a:rPr lang="en-US" altLang="zh-TW" dirty="0" err="1" smtClean="0"/>
-              <a:t>unAE</a:t>
+              <a:t>Bow,unAE,AE</a:t>
+            </a:r>
+            <a:endParaRPr lang="zh-TW" altLang="en-US" dirty="0"/>
+          </a:p>
+        </p:txBody>
+      </p:sp>
+      <p:sp>
+        <p:nvSpPr>
+          <p:cNvPr id="5" name="矩形 4"/>
+          <p:cNvSpPr/>
+          <p:nvPr/>
+        </p:nvSpPr>
+        <p:spPr>
+          <a:xfrm>
+            <a:off x="5004048" y="2042889"/>
+            <a:ext cx="1405193" cy="369332"/>
+          </a:xfrm>
+          <a:prstGeom prst="rect">
+            <a:avLst/>
+          </a:prstGeom>
+        </p:spPr>
+        <p:txBody>
+          <a:bodyPr wrap="none">
+            <a:spAutoFit/>
+          </a:bodyPr>
+          <a:lstStyle/>
+          <a:p>
+            <a:r>
+              <a:rPr lang="en-US" altLang="zh-TW" dirty="0" err="1" smtClean="0"/>
+              <a:t>AutoEncoder</a:t>
+            </a:r>
+            <a:endParaRPr lang="zh-TW" altLang="en-US" dirty="0"/>
+          </a:p>
+        </p:txBody>
+      </p:sp>
+      <p:sp>
+        <p:nvSpPr>
+          <p:cNvPr id="7" name="矩形 6"/>
+          <p:cNvSpPr/>
+          <p:nvPr/>
+        </p:nvSpPr>
+        <p:spPr>
+          <a:xfrm>
+            <a:off x="323527" y="2047270"/>
+            <a:ext cx="595741" cy="369332"/>
+          </a:xfrm>
+          <a:prstGeom prst="rect">
+            <a:avLst/>
+          </a:prstGeom>
+        </p:spPr>
+        <p:txBody>
+          <a:bodyPr wrap="none">
+            <a:spAutoFit/>
+          </a:bodyPr>
+          <a:lstStyle/>
+          <a:p>
+            <a:r>
+              <a:rPr lang="en-US" altLang="zh-TW" dirty="0" smtClean="0"/>
+              <a:t>Bow</a:t>
             </a:r>
             <a:endParaRPr lang="zh-TW" altLang="en-US" dirty="0"/>
           </a:p>
@@ -6117,8 +6416,8 @@
         </p:blipFill>
         <p:spPr>
           <a:xfrm>
-            <a:off x="1979712" y="1772816"/>
-            <a:ext cx="4680520" cy="3342217"/>
+            <a:off x="179512" y="2783172"/>
+            <a:ext cx="4032448" cy="2866439"/>
           </a:xfrm>
           <a:prstGeom prst="rect">
             <a:avLst/>
@@ -6130,10 +6429,45 @@
           </a:ln>
         </p:spPr>
       </p:pic>
+      <p:pic>
+        <p:nvPicPr>
+          <p:cNvPr id="10" name="圖片 9" descr="畫面剪輯"/>
+          <p:cNvPicPr>
+            <a:picLocks noChangeAspect="1"/>
+          </p:cNvPicPr>
+          <p:nvPr/>
+        </p:nvPicPr>
+        <p:blipFill>
+          <a:blip r:embed="rId3">
+            <a:extLst>
+              <a:ext uri="{28A0092B-C50C-407E-A947-70E740481C1C}">
+                <a14:useLocalDpi xmlns:a14="http://schemas.microsoft.com/office/drawing/2010/main" val="0"/>
+              </a:ext>
+            </a:extLst>
+          </a:blip>
+          <a:stretch>
+            <a:fillRect/>
+          </a:stretch>
+        </p:blipFill>
+        <p:spPr>
+          <a:xfrm>
+            <a:off x="4499993" y="2783173"/>
+            <a:ext cx="4032448" cy="2859372"/>
+          </a:xfrm>
+          <a:prstGeom prst="rect">
+            <a:avLst/>
+          </a:prstGeom>
+          <a:ln>
+            <a:solidFill>
+              <a:srgbClr val="FF0000"/>
+            </a:solidFill>
+          </a:ln>
+        </p:spPr>
+      </p:pic>
     </p:spTree>
     <p:extLst>
       <p:ext uri="{BB962C8B-B14F-4D97-AF65-F5344CB8AC3E}">
-        <p14:creationId xmlns:p14="http://schemas.microsoft.com/office/powerpoint/2010/main" val="2938989692"/>
+        <p14:creationId xmlns:p14="http://schemas.microsoft.com/office/powerpoint/2010/main" val="1014578427"/>
       </p:ext>
     </p:extLst>
   </p:cSld>
@@ -6179,6 +6513,107 @@
         </p:nvSpPr>
         <p:spPr/>
         <p:txBody>
+          <a:bodyPr>
+            <a:normAutofit/>
+          </a:bodyPr>
+          <a:lstStyle/>
+          <a:p>
+            <a:r>
+              <a:rPr lang="en-US" altLang="zh-TW" dirty="0" smtClean="0"/>
+              <a:t>Similarity between 2 industry-</a:t>
+            </a:r>
+            <a:r>
+              <a:rPr lang="en-US" altLang="zh-TW" dirty="0" err="1" smtClean="0"/>
+              <a:t>unAE</a:t>
+            </a:r>
+            <a:endParaRPr lang="zh-TW" altLang="en-US" dirty="0"/>
+          </a:p>
+        </p:txBody>
+      </p:sp>
+      <p:pic>
+        <p:nvPicPr>
+          <p:cNvPr id="9" name="圖片 8" descr="畫面剪輯"/>
+          <p:cNvPicPr>
+            <a:picLocks noChangeAspect="1"/>
+          </p:cNvPicPr>
+          <p:nvPr/>
+        </p:nvPicPr>
+        <p:blipFill>
+          <a:blip r:embed="rId2">
+            <a:extLst>
+              <a:ext uri="{28A0092B-C50C-407E-A947-70E740481C1C}">
+                <a14:useLocalDpi xmlns:a14="http://schemas.microsoft.com/office/drawing/2010/main" val="0"/>
+              </a:ext>
+            </a:extLst>
+          </a:blip>
+          <a:stretch>
+            <a:fillRect/>
+          </a:stretch>
+        </p:blipFill>
+        <p:spPr>
+          <a:xfrm>
+            <a:off x="1979712" y="1772816"/>
+            <a:ext cx="4680520" cy="3342217"/>
+          </a:xfrm>
+          <a:prstGeom prst="rect">
+            <a:avLst/>
+          </a:prstGeom>
+          <a:ln>
+            <a:solidFill>
+              <a:srgbClr val="FF0000"/>
+            </a:solidFill>
+          </a:ln>
+        </p:spPr>
+      </p:pic>
+    </p:spTree>
+    <p:extLst>
+      <p:ext uri="{BB962C8B-B14F-4D97-AF65-F5344CB8AC3E}">
+        <p14:creationId xmlns:p14="http://schemas.microsoft.com/office/powerpoint/2010/main" val="2938989692"/>
+      </p:ext>
+    </p:extLst>
+  </p:cSld>
+  <p:clrMapOvr>
+    <a:masterClrMapping/>
+  </p:clrMapOvr>
+  <p:timing>
+    <p:tnLst>
+      <p:par>
+        <p:cTn id="1" dur="indefinite" restart="never" nodeType="tmRoot"/>
+      </p:par>
+    </p:tnLst>
+  </p:timing>
+</p:sld>
+</file>
+
+<file path=ppt/slides/slide8.xml><?xml version="1.0" encoding="utf-8"?>
+<p:sld xmlns:a="http://schemas.openxmlformats.org/drawingml/2006/main" xmlns:r="http://schemas.openxmlformats.org/officeDocument/2006/relationships" xmlns:p="http://schemas.openxmlformats.org/presentationml/2006/main">
+  <p:cSld>
+    <p:spTree>
+      <p:nvGrpSpPr>
+        <p:cNvPr id="1" name=""/>
+        <p:cNvGrpSpPr/>
+        <p:nvPr/>
+      </p:nvGrpSpPr>
+      <p:grpSpPr>
+        <a:xfrm>
+          <a:off x="0" y="0"/>
+          <a:ext cx="0" cy="0"/>
+          <a:chOff x="0" y="0"/>
+          <a:chExt cx="0" cy="0"/>
+        </a:xfrm>
+      </p:grpSpPr>
+      <p:sp>
+        <p:nvSpPr>
+          <p:cNvPr id="2" name="標題 1"/>
+          <p:cNvSpPr>
+            <a:spLocks noGrp="1"/>
+          </p:cNvSpPr>
+          <p:nvPr>
+            <p:ph type="title"/>
+          </p:nvPr>
+        </p:nvSpPr>
+        <p:spPr/>
+        <p:txBody>
           <a:bodyPr/>
           <a:lstStyle/>
           <a:p>
@@ -6423,181 +6858,6 @@
     <p:extLst>
       <p:ext uri="{BB962C8B-B14F-4D97-AF65-F5344CB8AC3E}">
         <p14:creationId xmlns:p14="http://schemas.microsoft.com/office/powerpoint/2010/main" val="2907309338"/>
-      </p:ext>
-    </p:extLst>
-  </p:cSld>
-  <p:clrMapOvr>
-    <a:masterClrMapping/>
-  </p:clrMapOvr>
-</p:sld>
-</file>
-
-<file path=ppt/slides/slide8.xml><?xml version="1.0" encoding="utf-8"?>
-<p:sld xmlns:a="http://schemas.openxmlformats.org/drawingml/2006/main" xmlns:r="http://schemas.openxmlformats.org/officeDocument/2006/relationships" xmlns:p="http://schemas.openxmlformats.org/presentationml/2006/main">
-  <p:cSld>
-    <p:spTree>
-      <p:nvGrpSpPr>
-        <p:cNvPr id="1" name=""/>
-        <p:cNvGrpSpPr/>
-        <p:nvPr/>
-      </p:nvGrpSpPr>
-      <p:grpSpPr>
-        <a:xfrm>
-          <a:off x="0" y="0"/>
-          <a:ext cx="0" cy="0"/>
-          <a:chOff x="0" y="0"/>
-          <a:chExt cx="0" cy="0"/>
-        </a:xfrm>
-      </p:grpSpPr>
-      <p:sp>
-        <p:nvSpPr>
-          <p:cNvPr id="2" name="標題 1"/>
-          <p:cNvSpPr>
-            <a:spLocks noGrp="1"/>
-          </p:cNvSpPr>
-          <p:nvPr>
-            <p:ph type="title"/>
-          </p:nvPr>
-        </p:nvSpPr>
-        <p:spPr/>
-        <p:txBody>
-          <a:bodyPr/>
-          <a:lstStyle/>
-          <a:p>
-            <a:r>
-              <a:rPr lang="en-US" altLang="zh-TW" dirty="0" smtClean="0"/>
-              <a:t>Supervised </a:t>
-            </a:r>
-            <a:r>
-              <a:rPr lang="en-US" altLang="zh-TW" dirty="0" err="1" smtClean="0"/>
-              <a:t>Denoising</a:t>
-            </a:r>
-            <a:r>
-              <a:rPr lang="en-US" altLang="zh-TW" dirty="0" smtClean="0"/>
-              <a:t> AE</a:t>
-            </a:r>
-            <a:endParaRPr lang="zh-TW" altLang="en-US" dirty="0"/>
-          </a:p>
-        </p:txBody>
-      </p:sp>
-      <p:sp>
-        <p:nvSpPr>
-          <p:cNvPr id="3" name="內容版面配置區 2"/>
-          <p:cNvSpPr>
-            <a:spLocks noGrp="1"/>
-          </p:cNvSpPr>
-          <p:nvPr>
-            <p:ph idx="1"/>
-          </p:nvPr>
-        </p:nvSpPr>
-        <p:spPr/>
-        <p:txBody>
-          <a:bodyPr/>
-          <a:lstStyle/>
-          <a:p>
-            <a:r>
-              <a:rPr lang="en-US" altLang="zh-TW" dirty="0" smtClean="0"/>
-              <a:t>Dataset(from 10000 random)</a:t>
-            </a:r>
-          </a:p>
-          <a:p>
-            <a:r>
-              <a:rPr lang="en-US" altLang="zh-TW" dirty="0" smtClean="0"/>
-              <a:t>Train set (80%)</a:t>
-            </a:r>
-          </a:p>
-          <a:p>
-            <a:r>
-              <a:rPr lang="en-US" altLang="zh-TW" dirty="0" smtClean="0"/>
-              <a:t>Test set(20%)</a:t>
-            </a:r>
-          </a:p>
-          <a:p>
-            <a:pPr lvl="1"/>
-            <a:endParaRPr lang="en-US" altLang="zh-TW" dirty="0" smtClean="0"/>
-          </a:p>
-        </p:txBody>
-      </p:sp>
-      <p:pic>
-        <p:nvPicPr>
-          <p:cNvPr id="4" name="圖片 3" descr="畫面剪輯"/>
-          <p:cNvPicPr>
-            <a:picLocks noChangeAspect="1"/>
-          </p:cNvPicPr>
-          <p:nvPr/>
-        </p:nvPicPr>
-        <p:blipFill>
-          <a:blip r:embed="rId2">
-            <a:extLst>
-              <a:ext uri="{28A0092B-C50C-407E-A947-70E740481C1C}">
-                <a14:useLocalDpi xmlns:a14="http://schemas.microsoft.com/office/drawing/2010/main" val="0"/>
-              </a:ext>
-            </a:extLst>
-          </a:blip>
-          <a:stretch>
-            <a:fillRect/>
-          </a:stretch>
-        </p:blipFill>
-        <p:spPr>
-          <a:xfrm>
-            <a:off x="6516216" y="1412776"/>
-            <a:ext cx="1562318" cy="4734586"/>
-          </a:xfrm>
-          <a:prstGeom prst="rect">
-            <a:avLst/>
-          </a:prstGeom>
-        </p:spPr>
-      </p:pic>
-      <p:sp>
-        <p:nvSpPr>
-          <p:cNvPr id="5" name="圓角矩形 4"/>
-          <p:cNvSpPr/>
-          <p:nvPr/>
-        </p:nvSpPr>
-        <p:spPr>
-          <a:xfrm>
-            <a:off x="6372200" y="1844824"/>
-            <a:ext cx="1706334" cy="864096"/>
-          </a:xfrm>
-          <a:prstGeom prst="roundRect">
-            <a:avLst/>
-          </a:prstGeom>
-          <a:noFill/>
-          <a:ln>
-            <a:solidFill>
-              <a:srgbClr val="FF0000"/>
-            </a:solidFill>
-          </a:ln>
-        </p:spPr>
-        <p:style>
-          <a:lnRef idx="2">
-            <a:schemeClr val="accent1">
-              <a:shade val="50000"/>
-            </a:schemeClr>
-          </a:lnRef>
-          <a:fillRef idx="1">
-            <a:schemeClr val="accent1"/>
-          </a:fillRef>
-          <a:effectRef idx="0">
-            <a:schemeClr val="accent1"/>
-          </a:effectRef>
-          <a:fontRef idx="minor">
-            <a:schemeClr val="lt1"/>
-          </a:fontRef>
-        </p:style>
-        <p:txBody>
-          <a:bodyPr rtlCol="0" anchor="ctr"/>
-          <a:lstStyle/>
-          <a:p>
-            <a:pPr algn="ctr"/>
-            <a:endParaRPr lang="zh-TW" altLang="en-US"/>
-          </a:p>
-        </p:txBody>
-      </p:sp>
-    </p:spTree>
-    <p:extLst>
-      <p:ext uri="{BB962C8B-B14F-4D97-AF65-F5344CB8AC3E}">
-        <p14:creationId xmlns:p14="http://schemas.microsoft.com/office/powerpoint/2010/main" val="550522465"/>
       </p:ext>
     </p:extLst>
   </p:cSld>
@@ -6641,21 +6901,65 @@
           <a:p>
             <a:r>
               <a:rPr lang="en-US" altLang="zh-TW" dirty="0" smtClean="0"/>
-              <a:t>Encoder</a:t>
+              <a:t>Supervised </a:t>
+            </a:r>
+            <a:r>
+              <a:rPr lang="en-US" altLang="zh-TW" dirty="0" err="1" smtClean="0"/>
+              <a:t>Denoising</a:t>
+            </a:r>
+            <a:r>
+              <a:rPr lang="en-US" altLang="zh-TW" dirty="0" smtClean="0"/>
+              <a:t> AE</a:t>
             </a:r>
             <a:endParaRPr lang="zh-TW" altLang="en-US" dirty="0"/>
+          </a:p>
+        </p:txBody>
+      </p:sp>
+      <p:sp>
+        <p:nvSpPr>
+          <p:cNvPr id="3" name="內容版面配置區 2"/>
+          <p:cNvSpPr>
+            <a:spLocks noGrp="1"/>
+          </p:cNvSpPr>
+          <p:nvPr>
+            <p:ph idx="1"/>
+          </p:nvPr>
+        </p:nvSpPr>
+        <p:spPr/>
+        <p:txBody>
+          <a:bodyPr/>
+          <a:lstStyle/>
+          <a:p>
+            <a:r>
+              <a:rPr lang="en-US" altLang="zh-TW" dirty="0" smtClean="0"/>
+              <a:t>Dataset(from 10000 random)</a:t>
+            </a:r>
+          </a:p>
+          <a:p>
+            <a:r>
+              <a:rPr lang="en-US" altLang="zh-TW" dirty="0" smtClean="0"/>
+              <a:t>Train set (80%)</a:t>
+            </a:r>
+          </a:p>
+          <a:p>
+            <a:r>
+              <a:rPr lang="en-US" altLang="zh-TW" dirty="0" smtClean="0"/>
+              <a:t>Test set(20%)</a:t>
+            </a:r>
+          </a:p>
+          <a:p>
+            <a:pPr lvl="1"/>
+            <a:endParaRPr lang="en-US" altLang="zh-TW" dirty="0" smtClean="0"/>
           </a:p>
         </p:txBody>
       </p:sp>
       <p:pic>
         <p:nvPicPr>
-          <p:cNvPr id="4" name="內容版面配置區 3"/>
+          <p:cNvPr id="4" name="圖片 3" descr="畫面剪輯"/>
           <p:cNvPicPr>
-            <a:picLocks noGrp="1" noChangeAspect="1"/>
+            <a:picLocks noChangeAspect="1"/>
           </p:cNvPicPr>
-          <p:nvPr>
-            <p:ph idx="1"/>
-          </p:nvPr>
+          <p:nvPr/>
         </p:nvPicPr>
         <p:blipFill>
           <a:blip r:embed="rId2">
@@ -6671,45 +6975,64 @@
         </p:blipFill>
         <p:spPr>
           <a:xfrm>
-            <a:off x="1115616" y="2420888"/>
-            <a:ext cx="2181225" cy="2428875"/>
-          </a:xfrm>
-        </p:spPr>
-      </p:pic>
-      <p:pic>
-        <p:nvPicPr>
-          <p:cNvPr id="5" name="圖片 4" descr="畫面剪輯"/>
-          <p:cNvPicPr>
-            <a:picLocks noChangeAspect="1"/>
-          </p:cNvPicPr>
-          <p:nvPr/>
-        </p:nvPicPr>
-        <p:blipFill>
-          <a:blip r:embed="rId3">
-            <a:extLst>
-              <a:ext uri="{28A0092B-C50C-407E-A947-70E740481C1C}">
-                <a14:useLocalDpi xmlns:a14="http://schemas.microsoft.com/office/drawing/2010/main" val="0"/>
-              </a:ext>
-            </a:extLst>
-          </a:blip>
-          <a:stretch>
-            <a:fillRect/>
-          </a:stretch>
-        </p:blipFill>
-        <p:spPr>
-          <a:xfrm>
-            <a:off x="3563888" y="2492896"/>
-            <a:ext cx="5087060" cy="2038635"/>
+            <a:off x="6516216" y="1412776"/>
+            <a:ext cx="1562318" cy="4734586"/>
           </a:xfrm>
           <a:prstGeom prst="rect">
             <a:avLst/>
           </a:prstGeom>
         </p:spPr>
       </p:pic>
+      <p:sp>
+        <p:nvSpPr>
+          <p:cNvPr id="5" name="圓角矩形 4"/>
+          <p:cNvSpPr/>
+          <p:nvPr/>
+        </p:nvSpPr>
+        <p:spPr>
+          <a:xfrm>
+            <a:off x="6372200" y="1844824"/>
+            <a:ext cx="1706334" cy="864096"/>
+          </a:xfrm>
+          <a:prstGeom prst="roundRect">
+            <a:avLst/>
+          </a:prstGeom>
+          <a:noFill/>
+          <a:ln>
+            <a:solidFill>
+              <a:srgbClr val="FF0000"/>
+            </a:solidFill>
+          </a:ln>
+        </p:spPr>
+        <p:style>
+          <a:lnRef idx="2">
+            <a:schemeClr val="accent1">
+              <a:shade val="50000"/>
+            </a:schemeClr>
+          </a:lnRef>
+          <a:fillRef idx="1">
+            <a:schemeClr val="accent1"/>
+          </a:fillRef>
+          <a:effectRef idx="0">
+            <a:schemeClr val="accent1"/>
+          </a:effectRef>
+          <a:fontRef idx="minor">
+            <a:schemeClr val="lt1"/>
+          </a:fontRef>
+        </p:style>
+        <p:txBody>
+          <a:bodyPr rtlCol="0" anchor="ctr"/>
+          <a:lstStyle/>
+          <a:p>
+            <a:pPr algn="ctr"/>
+            <a:endParaRPr lang="zh-TW" altLang="en-US"/>
+          </a:p>
+        </p:txBody>
+      </p:sp>
     </p:spTree>
     <p:extLst>
       <p:ext uri="{BB962C8B-B14F-4D97-AF65-F5344CB8AC3E}">
-        <p14:creationId xmlns:p14="http://schemas.microsoft.com/office/powerpoint/2010/main" val="1253809794"/>
+        <p14:creationId xmlns:p14="http://schemas.microsoft.com/office/powerpoint/2010/main" val="550522465"/>
       </p:ext>
     </p:extLst>
   </p:cSld>

</xml_diff>